<commit_message>
Edited thesis draft and did more calculations
</commit_message>
<xml_diff>
--- a/Research_Project/LHCb Starterkit/MSc Research Project Progress 31 Aug 2022.pptx
+++ b/Research_Project/LHCb Starterkit/MSc Research Project Progress 31 Aug 2022.pptx
@@ -4,11 +4,15 @@
   <p:sldMasterIdLst>
     <p:sldMasterId id="2147483648" r:id="rId1"/>
   </p:sldMasterIdLst>
+  <p:notesMasterIdLst>
+    <p:notesMasterId r:id="rId7"/>
+  </p:notesMasterIdLst>
   <p:sldIdLst>
     <p:sldId id="256" r:id="rId2"/>
     <p:sldId id="257" r:id="rId3"/>
     <p:sldId id="258" r:id="rId4"/>
     <p:sldId id="259" r:id="rId5"/>
+    <p:sldId id="260" r:id="rId6"/>
   </p:sldIdLst>
   <p:sldSz cx="12192000" cy="6858000"/>
   <p:notesSz cx="6858000" cy="9144000"/>
@@ -115,6 +119,440 @@
 </p:presentation>
 </file>
 
+<file path=ppt/notesMasters/notesMaster1.xml><?xml version="1.0" encoding="utf-8"?>
+<p:notesMaster xmlns:a="http://schemas.openxmlformats.org/drawingml/2006/main" xmlns:r="http://schemas.openxmlformats.org/officeDocument/2006/relationships" xmlns:p="http://schemas.openxmlformats.org/presentationml/2006/main">
+  <p:cSld>
+    <p:bg>
+      <p:bgRef idx="1001">
+        <a:schemeClr val="bg1"/>
+      </p:bgRef>
+    </p:bg>
+    <p:spTree>
+      <p:nvGrpSpPr>
+        <p:cNvPr id="1" name=""/>
+        <p:cNvGrpSpPr/>
+        <p:nvPr/>
+      </p:nvGrpSpPr>
+      <p:grpSpPr>
+        <a:xfrm>
+          <a:off x="0" y="0"/>
+          <a:ext cx="0" cy="0"/>
+          <a:chOff x="0" y="0"/>
+          <a:chExt cx="0" cy="0"/>
+        </a:xfrm>
+      </p:grpSpPr>
+      <p:sp>
+        <p:nvSpPr>
+          <p:cNvPr id="2" name="Header Placeholder 1"/>
+          <p:cNvSpPr>
+            <a:spLocks noGrp="1"/>
+          </p:cNvSpPr>
+          <p:nvPr>
+            <p:ph type="hdr" sz="quarter"/>
+          </p:nvPr>
+        </p:nvSpPr>
+        <p:spPr>
+          <a:xfrm>
+            <a:off x="0" y="0"/>
+            <a:ext cx="2971800" cy="458788"/>
+          </a:xfrm>
+          <a:prstGeom prst="rect">
+            <a:avLst/>
+          </a:prstGeom>
+        </p:spPr>
+        <p:txBody>
+          <a:bodyPr vert="horz" lIns="91440" tIns="45720" rIns="91440" bIns="45720" rtlCol="0"/>
+          <a:lstStyle>
+            <a:lvl1pPr algn="l">
+              <a:defRPr sz="1200"/>
+            </a:lvl1pPr>
+          </a:lstStyle>
+          <a:p>
+            <a:endParaRPr lang="en-AU"/>
+          </a:p>
+        </p:txBody>
+      </p:sp>
+      <p:sp>
+        <p:nvSpPr>
+          <p:cNvPr id="3" name="Date Placeholder 2"/>
+          <p:cNvSpPr>
+            <a:spLocks noGrp="1"/>
+          </p:cNvSpPr>
+          <p:nvPr>
+            <p:ph type="dt" idx="1"/>
+          </p:nvPr>
+        </p:nvSpPr>
+        <p:spPr>
+          <a:xfrm>
+            <a:off x="3884613" y="0"/>
+            <a:ext cx="2971800" cy="458788"/>
+          </a:xfrm>
+          <a:prstGeom prst="rect">
+            <a:avLst/>
+          </a:prstGeom>
+        </p:spPr>
+        <p:txBody>
+          <a:bodyPr vert="horz" lIns="91440" tIns="45720" rIns="91440" bIns="45720" rtlCol="0"/>
+          <a:lstStyle>
+            <a:lvl1pPr algn="r">
+              <a:defRPr sz="1200"/>
+            </a:lvl1pPr>
+          </a:lstStyle>
+          <a:p>
+            <a:fld id="{FC50BE67-3C8E-4570-A99E-8EC5CD30FB7F}" type="datetimeFigureOut">
+              <a:rPr lang="en-AU" smtClean="0"/>
+              <a:t>7/09/2022</a:t>
+            </a:fld>
+            <a:endParaRPr lang="en-AU"/>
+          </a:p>
+        </p:txBody>
+      </p:sp>
+      <p:sp>
+        <p:nvSpPr>
+          <p:cNvPr id="4" name="Slide Image Placeholder 3"/>
+          <p:cNvSpPr>
+            <a:spLocks noGrp="1" noRot="1" noChangeAspect="1"/>
+          </p:cNvSpPr>
+          <p:nvPr>
+            <p:ph type="sldImg" idx="2"/>
+          </p:nvPr>
+        </p:nvSpPr>
+        <p:spPr>
+          <a:xfrm>
+            <a:off x="685800" y="1143000"/>
+            <a:ext cx="5486400" cy="3086100"/>
+          </a:xfrm>
+          <a:prstGeom prst="rect">
+            <a:avLst/>
+          </a:prstGeom>
+          <a:noFill/>
+          <a:ln w="12700">
+            <a:solidFill>
+              <a:prstClr val="black"/>
+            </a:solidFill>
+          </a:ln>
+        </p:spPr>
+        <p:txBody>
+          <a:bodyPr vert="horz" lIns="91440" tIns="45720" rIns="91440" bIns="45720" rtlCol="0" anchor="ctr"/>
+          <a:lstStyle/>
+          <a:p>
+            <a:endParaRPr lang="en-AU"/>
+          </a:p>
+        </p:txBody>
+      </p:sp>
+      <p:sp>
+        <p:nvSpPr>
+          <p:cNvPr id="5" name="Notes Placeholder 4"/>
+          <p:cNvSpPr>
+            <a:spLocks noGrp="1"/>
+          </p:cNvSpPr>
+          <p:nvPr>
+            <p:ph type="body" sz="quarter" idx="3"/>
+          </p:nvPr>
+        </p:nvSpPr>
+        <p:spPr>
+          <a:xfrm>
+            <a:off x="685800" y="4400550"/>
+            <a:ext cx="5486400" cy="3600450"/>
+          </a:xfrm>
+          <a:prstGeom prst="rect">
+            <a:avLst/>
+          </a:prstGeom>
+        </p:spPr>
+        <p:txBody>
+          <a:bodyPr vert="horz" lIns="91440" tIns="45720" rIns="91440" bIns="45720" rtlCol="0"/>
+          <a:lstStyle/>
+          <a:p>
+            <a:pPr lvl="0"/>
+            <a:r>
+              <a:rPr lang="en-US"/>
+              <a:t>Click to edit Master text styles</a:t>
+            </a:r>
+          </a:p>
+          <a:p>
+            <a:pPr lvl="1"/>
+            <a:r>
+              <a:rPr lang="en-US"/>
+              <a:t>Second level</a:t>
+            </a:r>
+          </a:p>
+          <a:p>
+            <a:pPr lvl="2"/>
+            <a:r>
+              <a:rPr lang="en-US"/>
+              <a:t>Third level</a:t>
+            </a:r>
+          </a:p>
+          <a:p>
+            <a:pPr lvl="3"/>
+            <a:r>
+              <a:rPr lang="en-US"/>
+              <a:t>Fourth level</a:t>
+            </a:r>
+          </a:p>
+          <a:p>
+            <a:pPr lvl="4"/>
+            <a:r>
+              <a:rPr lang="en-US"/>
+              <a:t>Fifth level</a:t>
+            </a:r>
+            <a:endParaRPr lang="en-AU"/>
+          </a:p>
+        </p:txBody>
+      </p:sp>
+      <p:sp>
+        <p:nvSpPr>
+          <p:cNvPr id="6" name="Footer Placeholder 5"/>
+          <p:cNvSpPr>
+            <a:spLocks noGrp="1"/>
+          </p:cNvSpPr>
+          <p:nvPr>
+            <p:ph type="ftr" sz="quarter" idx="4"/>
+          </p:nvPr>
+        </p:nvSpPr>
+        <p:spPr>
+          <a:xfrm>
+            <a:off x="0" y="8685213"/>
+            <a:ext cx="2971800" cy="458787"/>
+          </a:xfrm>
+          <a:prstGeom prst="rect">
+            <a:avLst/>
+          </a:prstGeom>
+        </p:spPr>
+        <p:txBody>
+          <a:bodyPr vert="horz" lIns="91440" tIns="45720" rIns="91440" bIns="45720" rtlCol="0" anchor="b"/>
+          <a:lstStyle>
+            <a:lvl1pPr algn="l">
+              <a:defRPr sz="1200"/>
+            </a:lvl1pPr>
+          </a:lstStyle>
+          <a:p>
+            <a:endParaRPr lang="en-AU"/>
+          </a:p>
+        </p:txBody>
+      </p:sp>
+      <p:sp>
+        <p:nvSpPr>
+          <p:cNvPr id="7" name="Slide Number Placeholder 6"/>
+          <p:cNvSpPr>
+            <a:spLocks noGrp="1"/>
+          </p:cNvSpPr>
+          <p:nvPr>
+            <p:ph type="sldNum" sz="quarter" idx="5"/>
+          </p:nvPr>
+        </p:nvSpPr>
+        <p:spPr>
+          <a:xfrm>
+            <a:off x="3884613" y="8685213"/>
+            <a:ext cx="2971800" cy="458787"/>
+          </a:xfrm>
+          <a:prstGeom prst="rect">
+            <a:avLst/>
+          </a:prstGeom>
+        </p:spPr>
+        <p:txBody>
+          <a:bodyPr vert="horz" lIns="91440" tIns="45720" rIns="91440" bIns="45720" rtlCol="0" anchor="b"/>
+          <a:lstStyle>
+            <a:lvl1pPr algn="r">
+              <a:defRPr sz="1200"/>
+            </a:lvl1pPr>
+          </a:lstStyle>
+          <a:p>
+            <a:fld id="{80406B9E-8C2B-40AB-A618-6DDADF7B8A8C}" type="slidenum">
+              <a:rPr lang="en-AU" smtClean="0"/>
+              <a:t>‹#›</a:t>
+            </a:fld>
+            <a:endParaRPr lang="en-AU"/>
+          </a:p>
+        </p:txBody>
+      </p:sp>
+    </p:spTree>
+    <p:extLst>
+      <p:ext uri="{BB962C8B-B14F-4D97-AF65-F5344CB8AC3E}">
+        <p14:creationId xmlns:p14="http://schemas.microsoft.com/office/powerpoint/2010/main" val="3871879800"/>
+      </p:ext>
+    </p:extLst>
+  </p:cSld>
+  <p:clrMap bg1="lt1" tx1="dk1" bg2="lt2" tx2="dk2" accent1="accent1" accent2="accent2" accent3="accent3" accent4="accent4" accent5="accent5" accent6="accent6" hlink="hlink" folHlink="folHlink"/>
+  <p:notesStyle>
+    <a:lvl1pPr marL="0" algn="l" defTabSz="914400" rtl="0" eaLnBrk="1" latinLnBrk="0" hangingPunct="1">
+      <a:defRPr sz="1200" kern="1200">
+        <a:solidFill>
+          <a:schemeClr val="tx1"/>
+        </a:solidFill>
+        <a:latin typeface="+mn-lt"/>
+        <a:ea typeface="+mn-ea"/>
+        <a:cs typeface="+mn-cs"/>
+      </a:defRPr>
+    </a:lvl1pPr>
+    <a:lvl2pPr marL="457200" algn="l" defTabSz="914400" rtl="0" eaLnBrk="1" latinLnBrk="0" hangingPunct="1">
+      <a:defRPr sz="1200" kern="1200">
+        <a:solidFill>
+          <a:schemeClr val="tx1"/>
+        </a:solidFill>
+        <a:latin typeface="+mn-lt"/>
+        <a:ea typeface="+mn-ea"/>
+        <a:cs typeface="+mn-cs"/>
+      </a:defRPr>
+    </a:lvl2pPr>
+    <a:lvl3pPr marL="914400" algn="l" defTabSz="914400" rtl="0" eaLnBrk="1" latinLnBrk="0" hangingPunct="1">
+      <a:defRPr sz="1200" kern="1200">
+        <a:solidFill>
+          <a:schemeClr val="tx1"/>
+        </a:solidFill>
+        <a:latin typeface="+mn-lt"/>
+        <a:ea typeface="+mn-ea"/>
+        <a:cs typeface="+mn-cs"/>
+      </a:defRPr>
+    </a:lvl3pPr>
+    <a:lvl4pPr marL="1371600" algn="l" defTabSz="914400" rtl="0" eaLnBrk="1" latinLnBrk="0" hangingPunct="1">
+      <a:defRPr sz="1200" kern="1200">
+        <a:solidFill>
+          <a:schemeClr val="tx1"/>
+        </a:solidFill>
+        <a:latin typeface="+mn-lt"/>
+        <a:ea typeface="+mn-ea"/>
+        <a:cs typeface="+mn-cs"/>
+      </a:defRPr>
+    </a:lvl4pPr>
+    <a:lvl5pPr marL="1828800" algn="l" defTabSz="914400" rtl="0" eaLnBrk="1" latinLnBrk="0" hangingPunct="1">
+      <a:defRPr sz="1200" kern="1200">
+        <a:solidFill>
+          <a:schemeClr val="tx1"/>
+        </a:solidFill>
+        <a:latin typeface="+mn-lt"/>
+        <a:ea typeface="+mn-ea"/>
+        <a:cs typeface="+mn-cs"/>
+      </a:defRPr>
+    </a:lvl5pPr>
+    <a:lvl6pPr marL="2286000" algn="l" defTabSz="914400" rtl="0" eaLnBrk="1" latinLnBrk="0" hangingPunct="1">
+      <a:defRPr sz="1200" kern="1200">
+        <a:solidFill>
+          <a:schemeClr val="tx1"/>
+        </a:solidFill>
+        <a:latin typeface="+mn-lt"/>
+        <a:ea typeface="+mn-ea"/>
+        <a:cs typeface="+mn-cs"/>
+      </a:defRPr>
+    </a:lvl6pPr>
+    <a:lvl7pPr marL="2743200" algn="l" defTabSz="914400" rtl="0" eaLnBrk="1" latinLnBrk="0" hangingPunct="1">
+      <a:defRPr sz="1200" kern="1200">
+        <a:solidFill>
+          <a:schemeClr val="tx1"/>
+        </a:solidFill>
+        <a:latin typeface="+mn-lt"/>
+        <a:ea typeface="+mn-ea"/>
+        <a:cs typeface="+mn-cs"/>
+      </a:defRPr>
+    </a:lvl7pPr>
+    <a:lvl8pPr marL="3200400" algn="l" defTabSz="914400" rtl="0" eaLnBrk="1" latinLnBrk="0" hangingPunct="1">
+      <a:defRPr sz="1200" kern="1200">
+        <a:solidFill>
+          <a:schemeClr val="tx1"/>
+        </a:solidFill>
+        <a:latin typeface="+mn-lt"/>
+        <a:ea typeface="+mn-ea"/>
+        <a:cs typeface="+mn-cs"/>
+      </a:defRPr>
+    </a:lvl8pPr>
+    <a:lvl9pPr marL="3657600" algn="l" defTabSz="914400" rtl="0" eaLnBrk="1" latinLnBrk="0" hangingPunct="1">
+      <a:defRPr sz="1200" kern="1200">
+        <a:solidFill>
+          <a:schemeClr val="tx1"/>
+        </a:solidFill>
+        <a:latin typeface="+mn-lt"/>
+        <a:ea typeface="+mn-ea"/>
+        <a:cs typeface="+mn-cs"/>
+      </a:defRPr>
+    </a:lvl9pPr>
+  </p:notesStyle>
+</p:notesMaster>
+</file>
+
+<file path=ppt/notesSlides/notesSlide1.xml><?xml version="1.0" encoding="utf-8"?>
+<p:notes xmlns:a="http://schemas.openxmlformats.org/drawingml/2006/main" xmlns:r="http://schemas.openxmlformats.org/officeDocument/2006/relationships" xmlns:p="http://schemas.openxmlformats.org/presentationml/2006/main">
+  <p:cSld>
+    <p:spTree>
+      <p:nvGrpSpPr>
+        <p:cNvPr id="1" name=""/>
+        <p:cNvGrpSpPr/>
+        <p:nvPr/>
+      </p:nvGrpSpPr>
+      <p:grpSpPr>
+        <a:xfrm>
+          <a:off x="0" y="0"/>
+          <a:ext cx="0" cy="0"/>
+          <a:chOff x="0" y="0"/>
+          <a:chExt cx="0" cy="0"/>
+        </a:xfrm>
+      </p:grpSpPr>
+      <p:sp>
+        <p:nvSpPr>
+          <p:cNvPr id="2" name="Slide Image Placeholder 1"/>
+          <p:cNvSpPr>
+            <a:spLocks noGrp="1" noRot="1" noChangeAspect="1"/>
+          </p:cNvSpPr>
+          <p:nvPr>
+            <p:ph type="sldImg"/>
+          </p:nvPr>
+        </p:nvSpPr>
+        <p:spPr/>
+      </p:sp>
+      <p:sp>
+        <p:nvSpPr>
+          <p:cNvPr id="3" name="Notes Placeholder 2"/>
+          <p:cNvSpPr>
+            <a:spLocks noGrp="1"/>
+          </p:cNvSpPr>
+          <p:nvPr>
+            <p:ph type="body" idx="1"/>
+          </p:nvPr>
+        </p:nvSpPr>
+        <p:spPr/>
+        <p:txBody>
+          <a:bodyPr/>
+          <a:lstStyle/>
+          <a:p>
+            <a:endParaRPr lang="en-AU" dirty="0"/>
+          </a:p>
+        </p:txBody>
+      </p:sp>
+      <p:sp>
+        <p:nvSpPr>
+          <p:cNvPr id="4" name="Slide Number Placeholder 3"/>
+          <p:cNvSpPr>
+            <a:spLocks noGrp="1"/>
+          </p:cNvSpPr>
+          <p:nvPr>
+            <p:ph type="sldNum" sz="quarter" idx="5"/>
+          </p:nvPr>
+        </p:nvSpPr>
+        <p:spPr/>
+        <p:txBody>
+          <a:bodyPr/>
+          <a:lstStyle/>
+          <a:p>
+            <a:fld id="{80406B9E-8C2B-40AB-A618-6DDADF7B8A8C}" type="slidenum">
+              <a:rPr lang="en-AU" smtClean="0"/>
+              <a:t>4</a:t>
+            </a:fld>
+            <a:endParaRPr lang="en-AU"/>
+          </a:p>
+        </p:txBody>
+      </p:sp>
+    </p:spTree>
+    <p:extLst>
+      <p:ext uri="{BB962C8B-B14F-4D97-AF65-F5344CB8AC3E}">
+        <p14:creationId xmlns:p14="http://schemas.microsoft.com/office/powerpoint/2010/main" val="31901037"/>
+      </p:ext>
+    </p:extLst>
+  </p:cSld>
+  <p:clrMapOvr>
+    <a:masterClrMapping/>
+  </p:clrMapOvr>
+</p:notes>
+</file>
+
 <file path=ppt/slideLayouts/slideLayout1.xml><?xml version="1.0" encoding="utf-8"?>
 <p:sldLayout xmlns:a="http://schemas.openxmlformats.org/drawingml/2006/main" xmlns:r="http://schemas.openxmlformats.org/officeDocument/2006/relationships" xmlns:p="http://schemas.openxmlformats.org/presentationml/2006/main" type="title" preserve="1">
   <p:cSld name="Title Slide">
@@ -264,7 +702,7 @@
           <a:p>
             <a:fld id="{6D79F432-8B29-4E94-9828-C190BA0C460D}" type="datetimeFigureOut">
               <a:rPr lang="en-AU" smtClean="0"/>
-              <a:t>30/08/2022</a:t>
+              <a:t>7/09/2022</a:t>
             </a:fld>
             <a:endParaRPr lang="en-AU"/>
           </a:p>
@@ -464,7 +902,7 @@
           <a:p>
             <a:fld id="{6D79F432-8B29-4E94-9828-C190BA0C460D}" type="datetimeFigureOut">
               <a:rPr lang="en-AU" smtClean="0"/>
-              <a:t>30/08/2022</a:t>
+              <a:t>7/09/2022</a:t>
             </a:fld>
             <a:endParaRPr lang="en-AU"/>
           </a:p>
@@ -674,7 +1112,7 @@
           <a:p>
             <a:fld id="{6D79F432-8B29-4E94-9828-C190BA0C460D}" type="datetimeFigureOut">
               <a:rPr lang="en-AU" smtClean="0"/>
-              <a:t>30/08/2022</a:t>
+              <a:t>7/09/2022</a:t>
             </a:fld>
             <a:endParaRPr lang="en-AU"/>
           </a:p>
@@ -874,7 +1312,7 @@
           <a:p>
             <a:fld id="{6D79F432-8B29-4E94-9828-C190BA0C460D}" type="datetimeFigureOut">
               <a:rPr lang="en-AU" smtClean="0"/>
-              <a:t>30/08/2022</a:t>
+              <a:t>7/09/2022</a:t>
             </a:fld>
             <a:endParaRPr lang="en-AU"/>
           </a:p>
@@ -1150,7 +1588,7 @@
           <a:p>
             <a:fld id="{6D79F432-8B29-4E94-9828-C190BA0C460D}" type="datetimeFigureOut">
               <a:rPr lang="en-AU" smtClean="0"/>
-              <a:t>30/08/2022</a:t>
+              <a:t>7/09/2022</a:t>
             </a:fld>
             <a:endParaRPr lang="en-AU"/>
           </a:p>
@@ -1418,7 +1856,7 @@
           <a:p>
             <a:fld id="{6D79F432-8B29-4E94-9828-C190BA0C460D}" type="datetimeFigureOut">
               <a:rPr lang="en-AU" smtClean="0"/>
-              <a:t>30/08/2022</a:t>
+              <a:t>7/09/2022</a:t>
             </a:fld>
             <a:endParaRPr lang="en-AU"/>
           </a:p>
@@ -1833,7 +2271,7 @@
           <a:p>
             <a:fld id="{6D79F432-8B29-4E94-9828-C190BA0C460D}" type="datetimeFigureOut">
               <a:rPr lang="en-AU" smtClean="0"/>
-              <a:t>30/08/2022</a:t>
+              <a:t>7/09/2022</a:t>
             </a:fld>
             <a:endParaRPr lang="en-AU"/>
           </a:p>
@@ -1975,7 +2413,7 @@
           <a:p>
             <a:fld id="{6D79F432-8B29-4E94-9828-C190BA0C460D}" type="datetimeFigureOut">
               <a:rPr lang="en-AU" smtClean="0"/>
-              <a:t>30/08/2022</a:t>
+              <a:t>7/09/2022</a:t>
             </a:fld>
             <a:endParaRPr lang="en-AU"/>
           </a:p>
@@ -2088,7 +2526,7 @@
           <a:p>
             <a:fld id="{6D79F432-8B29-4E94-9828-C190BA0C460D}" type="datetimeFigureOut">
               <a:rPr lang="en-AU" smtClean="0"/>
-              <a:t>30/08/2022</a:t>
+              <a:t>7/09/2022</a:t>
             </a:fld>
             <a:endParaRPr lang="en-AU"/>
           </a:p>
@@ -2401,7 +2839,7 @@
           <a:p>
             <a:fld id="{6D79F432-8B29-4E94-9828-C190BA0C460D}" type="datetimeFigureOut">
               <a:rPr lang="en-AU" smtClean="0"/>
-              <a:t>30/08/2022</a:t>
+              <a:t>7/09/2022</a:t>
             </a:fld>
             <a:endParaRPr lang="en-AU"/>
           </a:p>
@@ -2690,7 +3128,7 @@
           <a:p>
             <a:fld id="{6D79F432-8B29-4E94-9828-C190BA0C460D}" type="datetimeFigureOut">
               <a:rPr lang="en-AU" smtClean="0"/>
-              <a:t>30/08/2022</a:t>
+              <a:t>7/09/2022</a:t>
             </a:fld>
             <a:endParaRPr lang="en-AU"/>
           </a:p>
@@ -2933,7 +3371,7 @@
           <a:p>
             <a:fld id="{6D79F432-8B29-4E94-9828-C190BA0C460D}" type="datetimeFigureOut">
               <a:rPr lang="en-AU" smtClean="0"/>
-              <a:t>30/08/2022</a:t>
+              <a:t>7/09/2022</a:t>
             </a:fld>
             <a:endParaRPr lang="en-AU"/>
           </a:p>
@@ -3839,7 +4277,15 @@
           <a:p>
             <a:r>
               <a:rPr lang="en-AU" sz="7200" b="1" dirty="0"/>
-              <a:t>MSc Research Project: Progress (31/8/2022)</a:t>
+              <a:t>MSc Research Project: </a:t>
+            </a:r>
+            <a:r>
+              <a:rPr lang="en-AU" sz="7200" b="1"/>
+              <a:t>Progress (14/9/2022</a:t>
+            </a:r>
+            <a:r>
+              <a:rPr lang="en-AU" sz="7200" b="1" dirty="0"/>
+              <a:t>)</a:t>
             </a:r>
           </a:p>
         </p:txBody>
@@ -4168,13 +4614,13 @@
           <a:p>
             <a:r>
               <a:rPr lang="en-AU" b="1" dirty="0"/>
-              <a:t>Objectives Set in Previous Meeting (24/8/2022)</a:t>
+              <a:t>Objectives Set in Previous Meeting (1/9/2022)</a:t>
             </a:r>
           </a:p>
         </p:txBody>
       </p:sp>
-      <mc:AlternateContent xmlns:mc="http://schemas.openxmlformats.org/markup-compatibility/2006" xmlns:a14="http://schemas.microsoft.com/office/drawing/2010/main">
-        <mc:Choice Requires="a14">
+      <mc:AlternateContent xmlns:mc="http://schemas.openxmlformats.org/markup-compatibility/2006">
+        <mc:Choice xmlns:a14="http://schemas.microsoft.com/office/drawing/2010/main" Requires="a14">
           <p:sp>
             <p:nvSpPr>
               <p:cNvPr id="3" name="Content Placeholder 2">
@@ -4350,9 +4796,227 @@
                   <a:buAutoNum type="arabicPeriod"/>
                 </a:pPr>
                 <a:r>
-                  <a:rPr lang="en-AU" dirty="0"/>
+                  <a:rPr lang="en-AU" b="1" dirty="0">
+                    <a:solidFill>
+                      <a:schemeClr val="accent2">
+                        <a:lumMod val="75000"/>
+                      </a:schemeClr>
+                    </a:solidFill>
+                  </a:rPr>
                   <a:t>Plot signal selection efficiency curves for ALPs of varying masses</a:t>
                 </a:r>
+              </a:p>
+              <a:p>
+                <a:pPr marL="514350" indent="-514350">
+                  <a:buFont typeface="+mj-lt"/>
+                  <a:buAutoNum type="arabicPeriod"/>
+                </a:pPr>
+                <a:r>
+                  <a:rPr lang="en-AU" dirty="0">
+                    <a:solidFill>
+                      <a:schemeClr val="tx1"/>
+                    </a:solidFill>
+                  </a:rPr>
+                  <a:t>Run </a:t>
+                </a:r>
+                <a14:m>
+                  <m:oMath xmlns:m="http://schemas.openxmlformats.org/officeDocument/2006/math">
+                    <m:r>
+                      <a:rPr lang="en-AU" b="0" i="1" smtClean="0">
+                        <a:solidFill>
+                          <a:schemeClr val="tx1"/>
+                        </a:solidFill>
+                        <a:latin typeface="Cambria Math" panose="02040503050406030204" pitchFamily="18" charset="0"/>
+                      </a:rPr>
+                      <m:t>𝐵</m:t>
+                    </m:r>
+                    <m:r>
+                      <a:rPr lang="en-AU" b="0" i="1" smtClean="0">
+                        <a:solidFill>
+                          <a:schemeClr val="tx1"/>
+                        </a:solidFill>
+                        <a:latin typeface="Cambria Math" panose="02040503050406030204" pitchFamily="18" charset="0"/>
+                      </a:rPr>
+                      <m:t>→</m:t>
+                    </m:r>
+                    <m:sSup>
+                      <m:sSupPr>
+                        <m:ctrlPr>
+                          <a:rPr lang="en-AU" i="1" smtClean="0">
+                            <a:solidFill>
+                              <a:schemeClr val="tx1"/>
+                            </a:solidFill>
+                            <a:latin typeface="Cambria Math" panose="02040503050406030204" pitchFamily="18" charset="0"/>
+                          </a:rPr>
+                        </m:ctrlPr>
+                      </m:sSupPr>
+                      <m:e>
+                        <m:r>
+                          <a:rPr lang="en-AU" b="0" i="1" smtClean="0">
+                            <a:solidFill>
+                              <a:schemeClr val="tx1"/>
+                            </a:solidFill>
+                            <a:latin typeface="Cambria Math" panose="02040503050406030204" pitchFamily="18" charset="0"/>
+                          </a:rPr>
+                          <m:t>𝐾</m:t>
+                        </m:r>
+                      </m:e>
+                      <m:sup>
+                        <m:r>
+                          <a:rPr lang="en-AU" b="0" i="1" smtClean="0">
+                            <a:solidFill>
+                              <a:schemeClr val="tx1"/>
+                            </a:solidFill>
+                            <a:latin typeface="Cambria Math" panose="02040503050406030204" pitchFamily="18" charset="0"/>
+                          </a:rPr>
+                          <m:t>∗</m:t>
+                        </m:r>
+                      </m:sup>
+                    </m:sSup>
+                    <m:r>
+                      <a:rPr lang="en-AU" b="0" i="1" smtClean="0">
+                        <a:solidFill>
+                          <a:schemeClr val="tx1"/>
+                        </a:solidFill>
+                        <a:latin typeface="Cambria Math" panose="02040503050406030204" pitchFamily="18" charset="0"/>
+                      </a:rPr>
+                      <m:t>𝛾</m:t>
+                    </m:r>
+                  </m:oMath>
+                </a14:m>
+                <a:r>
+                  <a:rPr lang="en-AU" dirty="0">
+                    <a:solidFill>
+                      <a:schemeClr val="tx1"/>
+                    </a:solidFill>
+                  </a:rPr>
+                  <a:t> Simulation to compute </a:t>
+                </a:r>
+                <a14:m>
+                  <m:oMath xmlns:m="http://schemas.openxmlformats.org/officeDocument/2006/math">
+                    <m:f>
+                      <m:fPr>
+                        <m:ctrlPr>
+                          <a:rPr lang="en-AU" i="1" smtClean="0">
+                            <a:solidFill>
+                              <a:schemeClr val="tx1"/>
+                            </a:solidFill>
+                            <a:latin typeface="Cambria Math" panose="02040503050406030204" pitchFamily="18" charset="0"/>
+                          </a:rPr>
+                        </m:ctrlPr>
+                      </m:fPr>
+                      <m:num>
+                        <m:sSubSup>
+                          <m:sSubSupPr>
+                            <m:ctrlPr>
+                              <a:rPr lang="en-AU" i="1" smtClean="0">
+                                <a:solidFill>
+                                  <a:schemeClr val="tx1"/>
+                                </a:solidFill>
+                                <a:latin typeface="Cambria Math" panose="02040503050406030204" pitchFamily="18" charset="0"/>
+                              </a:rPr>
+                            </m:ctrlPr>
+                          </m:sSubSupPr>
+                          <m:e>
+                            <m:r>
+                              <a:rPr lang="en-AU" b="0" i="1" smtClean="0">
+                                <a:solidFill>
+                                  <a:schemeClr val="tx1"/>
+                                </a:solidFill>
+                                <a:latin typeface="Cambria Math" panose="02040503050406030204" pitchFamily="18" charset="0"/>
+                              </a:rPr>
+                              <m:t>𝜀</m:t>
+                            </m:r>
+                          </m:e>
+                          <m:sub>
+                            <m:r>
+                              <a:rPr lang="en-AU" b="0" i="1" smtClean="0">
+                                <a:solidFill>
+                                  <a:schemeClr val="tx1"/>
+                                </a:solidFill>
+                                <a:latin typeface="Cambria Math" panose="02040503050406030204" pitchFamily="18" charset="0"/>
+                              </a:rPr>
+                              <m:t>𝑔</m:t>
+                            </m:r>
+                          </m:sub>
+                          <m:sup>
+                            <m:r>
+                              <a:rPr lang="en-AU" b="0" i="1" smtClean="0">
+                                <a:solidFill>
+                                  <a:schemeClr val="tx1"/>
+                                </a:solidFill>
+                                <a:latin typeface="Cambria Math" panose="02040503050406030204" pitchFamily="18" charset="0"/>
+                              </a:rPr>
+                              <m:t>𝛾</m:t>
+                            </m:r>
+                          </m:sup>
+                        </m:sSubSup>
+                      </m:num>
+                      <m:den>
+                        <m:sSubSup>
+                          <m:sSubSupPr>
+                            <m:ctrlPr>
+                              <a:rPr lang="en-AU" i="1" smtClean="0">
+                                <a:solidFill>
+                                  <a:schemeClr val="tx1"/>
+                                </a:solidFill>
+                                <a:latin typeface="Cambria Math" panose="02040503050406030204" pitchFamily="18" charset="0"/>
+                              </a:rPr>
+                            </m:ctrlPr>
+                          </m:sSubSupPr>
+                          <m:e>
+                            <m:r>
+                              <a:rPr lang="en-AU" b="0" i="1" smtClean="0">
+                                <a:solidFill>
+                                  <a:schemeClr val="tx1"/>
+                                </a:solidFill>
+                                <a:latin typeface="Cambria Math" panose="02040503050406030204" pitchFamily="18" charset="0"/>
+                              </a:rPr>
+                              <m:t>𝜀</m:t>
+                            </m:r>
+                          </m:e>
+                          <m:sub>
+                            <m:r>
+                              <a:rPr lang="en-AU" b="0" i="1" smtClean="0">
+                                <a:solidFill>
+                                  <a:schemeClr val="tx1"/>
+                                </a:solidFill>
+                                <a:latin typeface="Cambria Math" panose="02040503050406030204" pitchFamily="18" charset="0"/>
+                              </a:rPr>
+                              <m:t>𝑔</m:t>
+                            </m:r>
+                          </m:sub>
+                          <m:sup>
+                            <m:r>
+                              <a:rPr lang="en-AU" b="0" i="1" smtClean="0">
+                                <a:solidFill>
+                                  <a:schemeClr val="tx1"/>
+                                </a:solidFill>
+                                <a:latin typeface="Cambria Math" panose="02040503050406030204" pitchFamily="18" charset="0"/>
+                              </a:rPr>
+                              <m:t>𝛾𝛾</m:t>
+                            </m:r>
+                          </m:sup>
+                        </m:sSubSup>
+                      </m:den>
+                    </m:f>
+                  </m:oMath>
+                </a14:m>
+                <a:endParaRPr lang="en-AU" dirty="0">
+                  <a:solidFill>
+                    <a:schemeClr val="tx1"/>
+                  </a:solidFill>
+                </a:endParaRPr>
+              </a:p>
+              <a:p>
+                <a:pPr marL="0" indent="0">
+                  <a:buNone/>
+                </a:pPr>
+                <a:endParaRPr lang="en-AU" b="1" dirty="0">
+                  <a:solidFill>
+                    <a:srgbClr val="FF0000"/>
+                  </a:solidFill>
+                </a:endParaRPr>
               </a:p>
               <a:p>
                 <a:pPr marL="0" indent="0">
@@ -4369,7 +5033,7 @@
             </p:txBody>
           </p:sp>
         </mc:Choice>
-        <mc:Fallback xmlns="">
+        <mc:Fallback>
           <p:sp>
             <p:nvSpPr>
               <p:cNvPr id="3" name="Content Placeholder 2">
@@ -4439,8 +5103,8 @@
           <a:chExt cx="0" cy="0"/>
         </a:xfrm>
       </p:grpSpPr>
-      <mc:AlternateContent xmlns:mc="http://schemas.openxmlformats.org/markup-compatibility/2006" xmlns:a14="http://schemas.microsoft.com/office/drawing/2010/main">
-        <mc:Choice Requires="a14">
+      <mc:AlternateContent xmlns:mc="http://schemas.openxmlformats.org/markup-compatibility/2006">
+        <mc:Choice xmlns:a14="http://schemas.microsoft.com/office/drawing/2010/main" Requires="a14">
           <p:sp>
             <p:nvSpPr>
               <p:cNvPr id="2" name="Title 1">
@@ -4478,30 +5142,30 @@
                     <m:sSup>
                       <m:sSupPr>
                         <m:ctrlPr>
-                          <a:rPr lang="en-AU" b="1" i="1" smtClean="0">
+                          <a:rPr lang="en-AU" i="1" smtClean="0">
                             <a:latin typeface="Cambria Math" panose="02040503050406030204" pitchFamily="18" charset="0"/>
                           </a:rPr>
                         </m:ctrlPr>
                       </m:sSupPr>
                       <m:e>
                         <m:r>
-                          <a:rPr lang="en-AU" b="1" i="1" smtClean="0">
-                            <a:latin typeface="Cambria Math" panose="02040503050406030204" pitchFamily="18" charset="0"/>
-                          </a:rPr>
-                          <m:t>𝑩</m:t>
+                          <a:rPr lang="en-AU" b="0" i="1" smtClean="0">
+                            <a:latin typeface="Cambria Math" panose="02040503050406030204" pitchFamily="18" charset="0"/>
+                          </a:rPr>
+                          <m:t>𝐵</m:t>
                         </m:r>
                       </m:e>
                       <m:sup>
                         <m:r>
-                          <a:rPr lang="en-AU" b="1" i="1" smtClean="0">
-                            <a:latin typeface="Cambria Math" panose="02040503050406030204" pitchFamily="18" charset="0"/>
-                          </a:rPr>
-                          <m:t>𝟎</m:t>
+                          <a:rPr lang="en-AU" b="0" i="1" smtClean="0">
+                            <a:latin typeface="Cambria Math" panose="02040503050406030204" pitchFamily="18" charset="0"/>
+                          </a:rPr>
+                          <m:t>0</m:t>
                         </m:r>
                       </m:sup>
                     </m:sSup>
                     <m:r>
-                      <a:rPr lang="en-AU" b="1" i="1" smtClean="0">
+                      <a:rPr lang="en-AU" b="0" i="1" smtClean="0">
                         <a:latin typeface="Cambria Math" panose="02040503050406030204" pitchFamily="18" charset="0"/>
                       </a:rPr>
                       <m:t>→</m:t>
@@ -4509,61 +5173,55 @@
                     <m:sSup>
                       <m:sSupPr>
                         <m:ctrlPr>
-                          <a:rPr lang="en-AU" b="1" i="1" smtClean="0">
+                          <a:rPr lang="en-AU" i="1" smtClean="0">
                             <a:latin typeface="Cambria Math" panose="02040503050406030204" pitchFamily="18" charset="0"/>
                           </a:rPr>
                         </m:ctrlPr>
                       </m:sSupPr>
                       <m:e>
                         <m:r>
-                          <a:rPr lang="en-AU" b="1" i="1" smtClean="0">
-                            <a:latin typeface="Cambria Math" panose="02040503050406030204" pitchFamily="18" charset="0"/>
-                          </a:rPr>
-                          <m:t>𝑲</m:t>
+                          <a:rPr lang="en-AU" b="0" i="1" smtClean="0">
+                            <a:latin typeface="Cambria Math" panose="02040503050406030204" pitchFamily="18" charset="0"/>
+                          </a:rPr>
+                          <m:t>𝐾</m:t>
                         </m:r>
                       </m:e>
                       <m:sup>
                         <m:r>
-                          <a:rPr lang="en-AU" b="1" i="1" smtClean="0">
-                            <a:latin typeface="Cambria Math" panose="02040503050406030204" pitchFamily="18" charset="0"/>
-                          </a:rPr>
-                          <m:t>∗</m:t>
-                        </m:r>
-                        <m:r>
-                          <a:rPr lang="en-AU" b="1" i="1" smtClean="0">
-                            <a:latin typeface="Cambria Math" panose="02040503050406030204" pitchFamily="18" charset="0"/>
-                          </a:rPr>
-                          <m:t>𝟎</m:t>
+                          <a:rPr lang="en-AU" b="0" i="1" smtClean="0">
+                            <a:latin typeface="Cambria Math" panose="02040503050406030204" pitchFamily="18" charset="0"/>
+                          </a:rPr>
+                          <m:t>∗0</m:t>
                         </m:r>
                       </m:sup>
                     </m:sSup>
                     <m:sSub>
                       <m:sSubPr>
                         <m:ctrlPr>
-                          <a:rPr lang="en-AU" b="1" i="1" smtClean="0">
+                          <a:rPr lang="en-AU" i="1" smtClean="0">
                             <a:latin typeface="Cambria Math" panose="02040503050406030204" pitchFamily="18" charset="0"/>
                           </a:rPr>
                         </m:ctrlPr>
                       </m:sSubPr>
                       <m:e>
                         <m:r>
-                          <a:rPr lang="en-AU" b="1" i="1" smtClean="0">
-                            <a:latin typeface="Cambria Math" panose="02040503050406030204" pitchFamily="18" charset="0"/>
-                          </a:rPr>
-                          <m:t>𝒂</m:t>
+                          <a:rPr lang="en-AU" b="0" i="1" smtClean="0">
+                            <a:latin typeface="Cambria Math" panose="02040503050406030204" pitchFamily="18" charset="0"/>
+                          </a:rPr>
+                          <m:t>𝑎</m:t>
                         </m:r>
                       </m:e>
                       <m:sub>
                         <m:r>
-                          <a:rPr lang="en-AU" b="1" i="1" smtClean="0">
-                            <a:latin typeface="Cambria Math" panose="02040503050406030204" pitchFamily="18" charset="0"/>
-                          </a:rPr>
-                          <m:t>𝟎</m:t>
+                          <a:rPr lang="en-AU" b="0" i="1" smtClean="0">
+                            <a:latin typeface="Cambria Math" panose="02040503050406030204" pitchFamily="18" charset="0"/>
+                          </a:rPr>
+                          <m:t>0</m:t>
                         </m:r>
                       </m:sub>
                     </m:sSub>
                     <m:r>
-                      <a:rPr lang="en-AU" b="1" i="1" smtClean="0">
+                      <a:rPr lang="en-AU" b="0" i="1" smtClean="0">
                         <a:latin typeface="Cambria Math" panose="02040503050406030204" pitchFamily="18" charset="0"/>
                       </a:rPr>
                       <m:t>, </m:t>
@@ -4571,48 +5229,48 @@
                     <m:sSub>
                       <m:sSubPr>
                         <m:ctrlPr>
-                          <a:rPr lang="en-AU" b="1" i="1" smtClean="0">
+                          <a:rPr lang="en-AU" i="1" smtClean="0">
                             <a:latin typeface="Cambria Math" panose="02040503050406030204" pitchFamily="18" charset="0"/>
                           </a:rPr>
                         </m:ctrlPr>
                       </m:sSubPr>
                       <m:e>
                         <m:r>
-                          <a:rPr lang="en-AU" b="1" i="1" smtClean="0">
-                            <a:latin typeface="Cambria Math" panose="02040503050406030204" pitchFamily="18" charset="0"/>
-                          </a:rPr>
-                          <m:t>𝒂</m:t>
+                          <a:rPr lang="en-AU" b="0" i="1" smtClean="0">
+                            <a:latin typeface="Cambria Math" panose="02040503050406030204" pitchFamily="18" charset="0"/>
+                          </a:rPr>
+                          <m:t>𝑎</m:t>
                         </m:r>
                       </m:e>
                       <m:sub>
                         <m:r>
-                          <a:rPr lang="en-AU" b="1" i="1" smtClean="0">
-                            <a:latin typeface="Cambria Math" panose="02040503050406030204" pitchFamily="18" charset="0"/>
-                          </a:rPr>
-                          <m:t>𝟎</m:t>
+                          <a:rPr lang="en-AU" b="0" i="1" smtClean="0">
+                            <a:latin typeface="Cambria Math" panose="02040503050406030204" pitchFamily="18" charset="0"/>
+                          </a:rPr>
+                          <m:t>0</m:t>
                         </m:r>
                       </m:sub>
                     </m:sSub>
                     <m:r>
-                      <a:rPr lang="en-AU" b="1" i="1" smtClean="0">
+                      <a:rPr lang="en-AU" b="0" i="1" smtClean="0">
                         <a:latin typeface="Cambria Math" panose="02040503050406030204" pitchFamily="18" charset="0"/>
                       </a:rPr>
                       <m:t>→</m:t>
                     </m:r>
                     <m:r>
-                      <a:rPr lang="en-AU" b="1" i="1" smtClean="0">
+                      <a:rPr lang="en-AU" b="0" i="1" smtClean="0">
                         <a:latin typeface="Cambria Math" panose="02040503050406030204" pitchFamily="18" charset="0"/>
                       </a:rPr>
-                      <m:t>𝜸𝜸</m:t>
+                      <m:t>𝛾𝛾</m:t>
                     </m:r>
                   </m:oMath>
                 </a14:m>
-                <a:endParaRPr lang="en-AU" b="1" dirty="0"/>
+                <a:endParaRPr lang="en-AU" dirty="0"/>
               </a:p>
             </p:txBody>
           </p:sp>
         </mc:Choice>
-        <mc:Fallback xmlns="">
+        <mc:Fallback>
           <p:sp>
             <p:nvSpPr>
               <p:cNvPr id="2" name="Title 1">
@@ -4682,7 +5340,7 @@
             </p:spPr>
             <p:txBody>
               <a:bodyPr>
-                <a:normAutofit lnSpcReduction="10000"/>
+                <a:normAutofit fontScale="92500" lnSpcReduction="10000"/>
               </a:bodyPr>
               <a:lstStyle/>
               <a:p>
@@ -5762,7 +6420,7 @@
                               <a:rPr lang="en-AU" b="0" i="1" smtClean="0">
                                 <a:latin typeface="Cambria Math" panose="02040503050406030204" pitchFamily="18" charset="0"/>
                               </a:rPr>
-                              <m:t>𝛾</m:t>
+                              <m:t>𝛾𝛾</m:t>
                             </m:r>
                           </m:sub>
                         </m:sSub>
@@ -5814,7 +6472,7 @@
                               <a:rPr lang="en-AU" b="0" i="1" smtClean="0">
                                 <a:latin typeface="Cambria Math" panose="02040503050406030204" pitchFamily="18" charset="0"/>
                               </a:rPr>
-                              <m:t>𝛾𝛾</m:t>
+                              <m:t>𝛾</m:t>
                             </m:r>
                             <m:r>
                               <a:rPr lang="en-AU" b="0" i="1" smtClean="0">
@@ -6462,7 +7120,7 @@
               <a:blipFill>
                 <a:blip r:embed="rId4"/>
                 <a:stretch>
-                  <a:fillRect l="-986" t="-3221" b="-2661"/>
+                  <a:fillRect l="-876" t="-2801"/>
                 </a:stretch>
               </a:blipFill>
             </p:spPr>
@@ -6532,7 +7190,7 @@
             <p:spPr>
               <a:xfrm>
                 <a:off x="447040" y="266332"/>
-                <a:ext cx="11297920" cy="1325563"/>
+                <a:ext cx="11499154" cy="1325563"/>
               </a:xfrm>
             </p:spPr>
             <p:txBody>
@@ -6705,12 +7363,12 @@
             <p:spPr>
               <a:xfrm>
                 <a:off x="447040" y="266332"/>
-                <a:ext cx="11297920" cy="1325563"/>
+                <a:ext cx="11499154" cy="1325563"/>
               </a:xfrm>
               <a:blipFill>
-                <a:blip r:embed="rId2"/>
+                <a:blip r:embed="rId3"/>
                 <a:stretch>
-                  <a:fillRect l="-2157" t="-13364" b="-21198"/>
+                  <a:fillRect l="-2120" t="-13364" b="-21198"/>
                 </a:stretch>
               </a:blipFill>
             </p:spPr>
@@ -6729,8 +7387,8 @@
           </p:sp>
         </mc:Fallback>
       </mc:AlternateContent>
-      <mc:AlternateContent xmlns:mc="http://schemas.openxmlformats.org/markup-compatibility/2006" xmlns:a14="http://schemas.microsoft.com/office/drawing/2010/main">
-        <mc:Choice Requires="a14">
+      <mc:AlternateContent xmlns:mc="http://schemas.openxmlformats.org/markup-compatibility/2006">
+        <mc:Choice xmlns:a14="http://schemas.microsoft.com/office/drawing/2010/main" Requires="a14">
           <p:sp>
             <p:nvSpPr>
               <p:cNvPr id="3" name="Content Placeholder 2">
@@ -6855,6 +7513,9 @@
                         <m:fPr>
                           <m:ctrlPr>
                             <a:rPr lang="en-AU" b="0" i="1" smtClean="0">
+                              <a:solidFill>
+                                <a:schemeClr val="tx1"/>
+                              </a:solidFill>
                               <a:latin typeface="Cambria Math" panose="02040503050406030204" pitchFamily="18" charset="0"/>
                             </a:rPr>
                           </m:ctrlPr>
@@ -6862,14 +7523,29 @@
                         <m:num>
                           <m:r>
                             <a:rPr lang="en-AU" b="0" i="1" smtClean="0">
+                              <a:solidFill>
+                                <a:schemeClr val="tx1"/>
+                              </a:solidFill>
                               <a:latin typeface="Cambria Math" panose="02040503050406030204" pitchFamily="18" charset="0"/>
                             </a:rPr>
-                            <m:t>0.18</m:t>
+                            <m:t>0.</m:t>
+                          </m:r>
+                          <m:r>
+                            <a:rPr lang="en-AU" b="0" i="1" smtClean="0">
+                              <a:solidFill>
+                                <a:schemeClr val="tx1"/>
+                              </a:solidFill>
+                              <a:latin typeface="Cambria Math" panose="02040503050406030204" pitchFamily="18" charset="0"/>
+                            </a:rPr>
+                            <m:t>2479</m:t>
                           </m:r>
                         </m:num>
                         <m:den>
                           <m:r>
                             <a:rPr lang="en-AU" b="0" i="1" smtClean="0">
+                              <a:solidFill>
+                                <a:schemeClr val="tx1"/>
+                              </a:solidFill>
                               <a:latin typeface="Cambria Math" panose="02040503050406030204" pitchFamily="18" charset="0"/>
                             </a:rPr>
                             <m:t>0.1725</m:t>
@@ -6880,7 +7556,19 @@
                         <a:rPr lang="en-AU" b="0" i="1" smtClean="0">
                           <a:latin typeface="Cambria Math" panose="02040503050406030204" pitchFamily="18" charset="0"/>
                         </a:rPr>
-                        <m:t>≈1.04</m:t>
+                        <m:t>≈1.</m:t>
+                      </m:r>
+                      <m:r>
+                        <a:rPr lang="en-AU" b="0" i="1" smtClean="0">
+                          <a:latin typeface="Cambria Math" panose="02040503050406030204" pitchFamily="18" charset="0"/>
+                        </a:rPr>
+                        <m:t>4</m:t>
+                      </m:r>
+                      <m:r>
+                        <a:rPr lang="en-AU" b="0" i="1" smtClean="0">
+                          <a:latin typeface="Cambria Math" panose="02040503050406030204" pitchFamily="18" charset="0"/>
+                        </a:rPr>
+                        <m:t>4</m:t>
                       </m:r>
                     </m:oMath>
                   </m:oMathPara>
@@ -6896,7 +7584,7 @@
             </p:txBody>
           </p:sp>
         </mc:Choice>
-        <mc:Fallback xmlns="">
+        <mc:Fallback>
           <p:sp>
             <p:nvSpPr>
               <p:cNvPr id="3" name="Content Placeholder 2">
@@ -6919,7 +7607,7 @@
                 <a:ext cx="8781661" cy="4351338"/>
               </a:xfrm>
               <a:blipFill>
-                <a:blip r:embed="rId3"/>
+                <a:blip r:embed="rId4"/>
                 <a:stretch>
                   <a:fillRect/>
                 </a:stretch>
@@ -6940,8 +7628,8 @@
           </p:sp>
         </mc:Fallback>
       </mc:AlternateContent>
-      <mc:AlternateContent xmlns:mc="http://schemas.openxmlformats.org/markup-compatibility/2006" xmlns:a14="http://schemas.microsoft.com/office/drawing/2010/main">
-        <mc:Choice Requires="a14">
+      <mc:AlternateContent xmlns:mc="http://schemas.openxmlformats.org/markup-compatibility/2006">
+        <mc:Choice xmlns:a14="http://schemas.microsoft.com/office/drawing/2010/main" Requires="a14">
           <p:sp>
             <p:nvSpPr>
               <p:cNvPr id="6" name="TextBox 5">
@@ -7060,7 +7748,7 @@
                         <a:rPr lang="en-AU" sz="2800" b="0" i="1" smtClean="0">
                           <a:latin typeface="Cambria Math" panose="02040503050406030204" pitchFamily="18" charset="0"/>
                         </a:rPr>
-                        <m:t>≈0.817</m:t>
+                        <m:t>≈1.22</m:t>
                       </m:r>
                     </m:oMath>
                   </m:oMathPara>
@@ -7070,7 +7758,7 @@
             </p:txBody>
           </p:sp>
         </mc:Choice>
-        <mc:Fallback xmlns="">
+        <mc:Fallback>
           <p:sp>
             <p:nvSpPr>
               <p:cNvPr id="6" name="TextBox 5">
@@ -7094,7 +7782,7 @@
                 <a:avLst/>
               </a:prstGeom>
               <a:blipFill>
-                <a:blip r:embed="rId4"/>
+                <a:blip r:embed="rId5"/>
                 <a:stretch>
                   <a:fillRect/>
                 </a:stretch>
@@ -7130,15 +7818,15 @@
           <p:nvPr/>
         </p:nvPicPr>
         <p:blipFill>
-          <a:blip r:embed="rId5"/>
+          <a:blip r:embed="rId6"/>
           <a:stretch>
             <a:fillRect/>
           </a:stretch>
         </p:blipFill>
         <p:spPr>
           <a:xfrm>
-            <a:off x="216677" y="2781748"/>
-            <a:ext cx="6527687" cy="2065556"/>
+            <a:off x="216677" y="2690308"/>
+            <a:ext cx="6781443" cy="2145852"/>
           </a:xfrm>
           <a:prstGeom prst="rect">
             <a:avLst/>
@@ -7160,7 +7848,7 @@
           <p:nvPr/>
         </p:nvPicPr>
         <p:blipFill>
-          <a:blip r:embed="rId6"/>
+          <a:blip r:embed="rId7"/>
           <a:stretch>
             <a:fillRect/>
           </a:stretch>
@@ -7175,12 +7863,12 @@
           </a:prstGeom>
         </p:spPr>
       </p:pic>
-      <mc:AlternateContent xmlns:mc="http://schemas.openxmlformats.org/markup-compatibility/2006" xmlns:a14="http://schemas.microsoft.com/office/drawing/2010/main">
-        <mc:Choice Requires="a14">
+      <mc:AlternateContent xmlns:mc="http://schemas.openxmlformats.org/markup-compatibility/2006">
+        <mc:Choice xmlns:a14="http://schemas.microsoft.com/office/drawing/2010/main" Requires="a14">
           <p:sp>
             <p:nvSpPr>
               <p:cNvPr id="12" name="TextBox 11">
-                <a:hlinkClick r:id="rId7"/>
+                <a:hlinkClick r:id="rId8"/>
                 <a:extLst>
                   <a:ext uri="{FF2B5EF4-FFF2-40B4-BE49-F238E27FC236}">
                     <a16:creationId xmlns:a16="http://schemas.microsoft.com/office/drawing/2014/main" id="{0E56EE9E-9DDA-530B-C364-1DEF1A5E9C92}"/>
@@ -7192,7 +7880,7 @@
             </p:nvSpPr>
             <p:spPr>
               <a:xfrm>
-                <a:off x="7437120" y="5217149"/>
+                <a:off x="7437120" y="5103156"/>
                 <a:ext cx="3474720" cy="369332"/>
               </a:xfrm>
               <a:prstGeom prst="rect">
@@ -7284,7 +7972,7 @@
             </p:txBody>
           </p:sp>
         </mc:Choice>
-        <mc:Fallback xmlns="">
+        <mc:Fallback>
           <p:sp>
             <p:nvSpPr>
               <p:cNvPr id="12" name="TextBox 11">
@@ -7302,7 +7990,7 @@
             </p:nvSpPr>
             <p:spPr>
               <a:xfrm>
-                <a:off x="7437120" y="5217149"/>
+                <a:off x="7437120" y="5103156"/>
                 <a:ext cx="3474720" cy="369332"/>
               </a:xfrm>
               <a:prstGeom prst="rect">
@@ -7311,7 +7999,7 @@
               <a:blipFill>
                 <a:blip r:embed="rId9"/>
                 <a:stretch>
-                  <a:fillRect b="-5000"/>
+                  <a:fillRect b="-3279"/>
                 </a:stretch>
               </a:blipFill>
             </p:spPr>
@@ -7330,8 +8018,8 @@
           </p:sp>
         </mc:Fallback>
       </mc:AlternateContent>
-      <mc:AlternateContent xmlns:mc="http://schemas.openxmlformats.org/markup-compatibility/2006" xmlns:a14="http://schemas.microsoft.com/office/drawing/2010/main">
-        <mc:Choice Requires="a14">
+      <mc:AlternateContent xmlns:mc="http://schemas.openxmlformats.org/markup-compatibility/2006">
+        <mc:Choice xmlns:a14="http://schemas.microsoft.com/office/drawing/2010/main" Requires="a14">
           <p:sp>
             <p:nvSpPr>
               <p:cNvPr id="13" name="TextBox 12">
@@ -7346,8 +8034,8 @@
             </p:nvSpPr>
             <p:spPr>
               <a:xfrm>
-                <a:off x="216677" y="5428224"/>
-                <a:ext cx="11297920" cy="1272208"/>
+                <a:off x="216677" y="5478510"/>
+                <a:ext cx="11297920" cy="1274260"/>
               </a:xfrm>
               <a:prstGeom prst="rect">
                 <a:avLst/>
@@ -7456,6 +8144,70 @@
                         <a:latin typeface="Cambria Math" panose="02040503050406030204" pitchFamily="18" charset="0"/>
                       </a:rPr>
                       <m:t>)</m:t>
+                    </m:r>
+                  </m:oMath>
+                </a14:m>
+                <a:r>
+                  <a:rPr lang="en-AU" b="0" dirty="0"/>
+                  <a:t>, and taking </a:t>
+                </a:r>
+                <a14:m>
+                  <m:oMath xmlns:m="http://schemas.openxmlformats.org/officeDocument/2006/math">
+                    <m:sSub>
+                      <m:sSubPr>
+                        <m:ctrlPr>
+                          <a:rPr lang="en-AU" b="0" i="1" smtClean="0">
+                            <a:latin typeface="Cambria Math" panose="02040503050406030204" pitchFamily="18" charset="0"/>
+                          </a:rPr>
+                        </m:ctrlPr>
+                      </m:sSubPr>
+                      <m:e>
+                        <m:r>
+                          <a:rPr lang="en-AU" b="0" i="1" smtClean="0">
+                            <a:latin typeface="Cambria Math" panose="02040503050406030204" pitchFamily="18" charset="0"/>
+                          </a:rPr>
+                          <m:t>𝑁</m:t>
+                        </m:r>
+                      </m:e>
+                      <m:sub>
+                        <m:sSup>
+                          <m:sSupPr>
+                            <m:ctrlPr>
+                              <a:rPr lang="en-AU" b="0" i="1" smtClean="0">
+                                <a:latin typeface="Cambria Math" panose="02040503050406030204" pitchFamily="18" charset="0"/>
+                              </a:rPr>
+                            </m:ctrlPr>
+                          </m:sSupPr>
+                          <m:e>
+                            <m:r>
+                              <a:rPr lang="en-AU" b="0" i="1" smtClean="0">
+                                <a:latin typeface="Cambria Math" panose="02040503050406030204" pitchFamily="18" charset="0"/>
+                              </a:rPr>
+                              <m:t>𝐾</m:t>
+                            </m:r>
+                          </m:e>
+                          <m:sup>
+                            <m:r>
+                              <a:rPr lang="en-AU" b="0" i="1" smtClean="0">
+                                <a:latin typeface="Cambria Math" panose="02040503050406030204" pitchFamily="18" charset="0"/>
+                              </a:rPr>
+                              <m:t>∗</m:t>
+                            </m:r>
+                          </m:sup>
+                        </m:sSup>
+                        <m:r>
+                          <a:rPr lang="en-AU" b="0" i="1" smtClean="0">
+                            <a:latin typeface="Cambria Math" panose="02040503050406030204" pitchFamily="18" charset="0"/>
+                          </a:rPr>
+                          <m:t>𝛾</m:t>
+                        </m:r>
+                      </m:sub>
+                    </m:sSub>
+                    <m:r>
+                      <a:rPr lang="en-AU" b="0" i="1" smtClean="0">
+                        <a:latin typeface="Cambria Math" panose="02040503050406030204" pitchFamily="18" charset="0"/>
+                      </a:rPr>
+                      <m:t>=5279</m:t>
                     </m:r>
                   </m:oMath>
                 </a14:m>
@@ -7612,7 +8364,7 @@
                         <a:rPr lang="en-AU" b="0" i="1" smtClean="0">
                           <a:latin typeface="Cambria Math" panose="02040503050406030204" pitchFamily="18" charset="0"/>
                         </a:rPr>
-                        <m:t>)=4.33×1</m:t>
+                        <m:t>)=1.443×1</m:t>
                       </m:r>
                       <m:sSup>
                         <m:sSupPr>
@@ -7635,140 +8387,13 @@
                             <a:rPr lang="en-AU" b="0" i="1" smtClean="0">
                               <a:latin typeface="Cambria Math" panose="02040503050406030204" pitchFamily="18" charset="0"/>
                             </a:rPr>
-                            <m:t>−5</m:t>
+                            <m:t>−</m:t>
                           </m:r>
-                        </m:sup>
-                      </m:sSup>
-                      <m:d>
-                        <m:dPr>
-                          <m:ctrlPr>
-                            <a:rPr lang="en-AU" i="1" smtClean="0">
-                              <a:latin typeface="Cambria Math" panose="02040503050406030204" pitchFamily="18" charset="0"/>
-                            </a:rPr>
-                          </m:ctrlPr>
-                        </m:dPr>
-                        <m:e>
-                          <m:f>
-                            <m:fPr>
-                              <m:ctrlPr>
-                                <a:rPr lang="en-AU" i="1" smtClean="0">
-                                  <a:latin typeface="Cambria Math" panose="02040503050406030204" pitchFamily="18" charset="0"/>
-                                </a:rPr>
-                              </m:ctrlPr>
-                            </m:fPr>
-                            <m:num>
-                              <m:r>
-                                <a:rPr lang="en-AU" b="0" i="1" smtClean="0">
-                                  <a:latin typeface="Cambria Math" panose="02040503050406030204" pitchFamily="18" charset="0"/>
-                                </a:rPr>
-                                <m:t>0.853</m:t>
-                              </m:r>
-                              <m:sSubSup>
-                                <m:sSubSupPr>
-                                  <m:ctrlPr>
-                                    <a:rPr lang="en-AU" i="1" smtClean="0">
-                                      <a:latin typeface="Cambria Math" panose="02040503050406030204" pitchFamily="18" charset="0"/>
-                                    </a:rPr>
-                                  </m:ctrlPr>
-                                </m:sSubSupPr>
-                                <m:e>
-                                  <m:r>
-                                    <a:rPr lang="en-AU" b="0" i="1" smtClean="0">
-                                      <a:latin typeface="Cambria Math" panose="02040503050406030204" pitchFamily="18" charset="0"/>
-                                    </a:rPr>
-                                    <m:t>𝜀</m:t>
-                                  </m:r>
-                                </m:e>
-                                <m:sub>
-                                  <m:r>
-                                    <a:rPr lang="en-AU" b="0" i="1" smtClean="0">
-                                      <a:latin typeface="Cambria Math" panose="02040503050406030204" pitchFamily="18" charset="0"/>
-                                    </a:rPr>
-                                    <m:t>𝑟𝑒𝑐</m:t>
-                                  </m:r>
-                                </m:sub>
-                                <m:sup>
-                                  <m:r>
-                                    <a:rPr lang="en-AU" b="0" i="1" smtClean="0">
-                                      <a:latin typeface="Cambria Math" panose="02040503050406030204" pitchFamily="18" charset="0"/>
-                                    </a:rPr>
-                                    <m:t>𝛾</m:t>
-                                  </m:r>
-                                </m:sup>
-                              </m:sSubSup>
-                            </m:num>
-                            <m:den>
-                              <m:sSubSup>
-                                <m:sSubSupPr>
-                                  <m:ctrlPr>
-                                    <a:rPr lang="en-AU" i="1" smtClean="0">
-                                      <a:latin typeface="Cambria Math" panose="02040503050406030204" pitchFamily="18" charset="0"/>
-                                    </a:rPr>
-                                  </m:ctrlPr>
-                                </m:sSubSupPr>
-                                <m:e>
-                                  <m:r>
-                                    <a:rPr lang="en-AU" b="0" i="1" smtClean="0">
-                                      <a:latin typeface="Cambria Math" panose="02040503050406030204" pitchFamily="18" charset="0"/>
-                                    </a:rPr>
-                                    <m:t>𝜀</m:t>
-                                  </m:r>
-                                </m:e>
-                                <m:sub>
-                                  <m:r>
-                                    <a:rPr lang="en-AU" b="0" i="1" smtClean="0">
-                                      <a:latin typeface="Cambria Math" panose="02040503050406030204" pitchFamily="18" charset="0"/>
-                                    </a:rPr>
-                                    <m:t>𝑟𝑒𝑐</m:t>
-                                  </m:r>
-                                </m:sub>
-                                <m:sup>
-                                  <m:r>
-                                    <a:rPr lang="en-AU" b="0" i="1" smtClean="0">
-                                      <a:latin typeface="Cambria Math" panose="02040503050406030204" pitchFamily="18" charset="0"/>
-                                    </a:rPr>
-                                    <m:t>𝛾𝛾</m:t>
-                                  </m:r>
-                                </m:sup>
-                              </m:sSubSup>
-                            </m:den>
-                          </m:f>
                           <m:r>
                             <a:rPr lang="en-AU" b="0" i="1" smtClean="0">
                               <a:latin typeface="Cambria Math" panose="02040503050406030204" pitchFamily="18" charset="0"/>
                             </a:rPr>
-                            <m:t> </m:t>
-                          </m:r>
-                        </m:e>
-                      </m:d>
-                      <m:r>
-                        <a:rPr lang="en-AU" b="0" i="1" smtClean="0">
-                          <a:latin typeface="Cambria Math" panose="02040503050406030204" pitchFamily="18" charset="0"/>
-                        </a:rPr>
-                        <m:t>=3.69×1</m:t>
-                      </m:r>
-                      <m:sSup>
-                        <m:sSupPr>
-                          <m:ctrlPr>
-                            <a:rPr lang="en-AU" i="1" smtClean="0">
-                              <a:latin typeface="Cambria Math" panose="02040503050406030204" pitchFamily="18" charset="0"/>
-                            </a:rPr>
-                          </m:ctrlPr>
-                        </m:sSupPr>
-                        <m:e>
-                          <m:r>
-                            <a:rPr lang="en-AU" b="0" i="1" smtClean="0">
-                              <a:latin typeface="Cambria Math" panose="02040503050406030204" pitchFamily="18" charset="0"/>
-                            </a:rPr>
-                            <m:t>0</m:t>
-                          </m:r>
-                        </m:e>
-                        <m:sup>
-                          <m:r>
-                            <a:rPr lang="en-AU" b="0" i="1" smtClean="0">
-                              <a:latin typeface="Cambria Math" panose="02040503050406030204" pitchFamily="18" charset="0"/>
-                            </a:rPr>
-                            <m:t>−5</m:t>
+                            <m:t>8</m:t>
                           </m:r>
                         </m:sup>
                       </m:sSup>
@@ -7857,6 +8482,62 @@
                           </m:sSubSup>
                         </m:den>
                       </m:f>
+                      <m:r>
+                        <a:rPr lang="en-AU" b="0" i="1" smtClean="0">
+                          <a:latin typeface="Cambria Math" panose="02040503050406030204" pitchFamily="18" charset="0"/>
+                        </a:rPr>
+                        <m:t>×</m:t>
+                      </m:r>
+                      <m:sSub>
+                        <m:sSubPr>
+                          <m:ctrlPr>
+                            <a:rPr lang="en-AU" b="0" i="1" smtClean="0">
+                              <a:latin typeface="Cambria Math" panose="02040503050406030204" pitchFamily="18" charset="0"/>
+                            </a:rPr>
+                          </m:ctrlPr>
+                        </m:sSubPr>
+                        <m:e>
+                          <m:r>
+                            <a:rPr lang="en-AU" b="0" i="1" smtClean="0">
+                              <a:latin typeface="Cambria Math" panose="02040503050406030204" pitchFamily="18" charset="0"/>
+                            </a:rPr>
+                            <m:t>𝑁</m:t>
+                          </m:r>
+                        </m:e>
+                        <m:sub>
+                          <m:sSup>
+                            <m:sSupPr>
+                              <m:ctrlPr>
+                                <a:rPr lang="en-AU" b="0" i="1" smtClean="0">
+                                  <a:latin typeface="Cambria Math" panose="02040503050406030204" pitchFamily="18" charset="0"/>
+                                </a:rPr>
+                              </m:ctrlPr>
+                            </m:sSupPr>
+                            <m:e>
+                              <m:r>
+                                <a:rPr lang="en-AU" b="0" i="1" smtClean="0">
+                                  <a:latin typeface="Cambria Math" panose="02040503050406030204" pitchFamily="18" charset="0"/>
+                                </a:rPr>
+                                <m:t>𝐾</m:t>
+                              </m:r>
+                            </m:e>
+                            <m:sup>
+                              <m:r>
+                                <a:rPr lang="en-AU" b="0" i="1" smtClean="0">
+                                  <a:latin typeface="Cambria Math" panose="02040503050406030204" pitchFamily="18" charset="0"/>
+                                </a:rPr>
+                                <m:t>∗</m:t>
+                              </m:r>
+                            </m:sup>
+                          </m:sSup>
+                          <m:r>
+                            <a:rPr lang="en-AU" b="0" i="1" smtClean="0">
+                              <a:latin typeface="Cambria Math" panose="02040503050406030204" pitchFamily="18" charset="0"/>
+                            </a:rPr>
+                            <m:t>𝛾𝛾</m:t>
+                          </m:r>
+                        </m:sub>
+                      </m:sSub>
                     </m:oMath>
                   </m:oMathPara>
                 </a14:m>
@@ -7865,7 +8546,7 @@
             </p:txBody>
           </p:sp>
         </mc:Choice>
-        <mc:Fallback xmlns="">
+        <mc:Fallback>
           <p:sp>
             <p:nvSpPr>
               <p:cNvPr id="13" name="TextBox 12">
@@ -7882,8 +8563,8 @@
             </p:nvSpPr>
             <p:spPr>
               <a:xfrm>
-                <a:off x="216677" y="5428224"/>
-                <a:ext cx="11297920" cy="1272208"/>
+                <a:off x="216677" y="5478510"/>
+                <a:ext cx="11297920" cy="1274260"/>
               </a:xfrm>
               <a:prstGeom prst="rect">
                 <a:avLst/>
@@ -7914,6 +8595,783 @@
     <p:extLst>
       <p:ext uri="{BB962C8B-B14F-4D97-AF65-F5344CB8AC3E}">
         <p14:creationId xmlns:p14="http://schemas.microsoft.com/office/powerpoint/2010/main" val="650954377"/>
+      </p:ext>
+    </p:extLst>
+  </p:cSld>
+  <p:clrMapOvr>
+    <a:masterClrMapping/>
+  </p:clrMapOvr>
+</p:sld>
+</file>
+
+<file path=ppt/slides/slide5.xml><?xml version="1.0" encoding="utf-8"?>
+<p:sld xmlns:a="http://schemas.openxmlformats.org/drawingml/2006/main" xmlns:r="http://schemas.openxmlformats.org/officeDocument/2006/relationships" xmlns:p="http://schemas.openxmlformats.org/presentationml/2006/main">
+  <p:cSld>
+    <p:spTree>
+      <p:nvGrpSpPr>
+        <p:cNvPr id="1" name=""/>
+        <p:cNvGrpSpPr/>
+        <p:nvPr/>
+      </p:nvGrpSpPr>
+      <p:grpSpPr>
+        <a:xfrm>
+          <a:off x="0" y="0"/>
+          <a:ext cx="0" cy="0"/>
+          <a:chOff x="0" y="0"/>
+          <a:chExt cx="0" cy="0"/>
+        </a:xfrm>
+      </p:grpSpPr>
+      <mc:AlternateContent xmlns:mc="http://schemas.openxmlformats.org/markup-compatibility/2006">
+        <mc:Choice xmlns:a14="http://schemas.microsoft.com/office/drawing/2010/main" Requires="a14">
+          <p:sp>
+            <p:nvSpPr>
+              <p:cNvPr id="2" name="Title 1">
+                <a:extLst>
+                  <a:ext uri="{FF2B5EF4-FFF2-40B4-BE49-F238E27FC236}">
+                    <a16:creationId xmlns:a16="http://schemas.microsoft.com/office/drawing/2014/main" id="{A242D612-5768-22B7-1794-2D1F7611D9DD}"/>
+                  </a:ext>
+                </a:extLst>
+              </p:cNvPr>
+              <p:cNvSpPr>
+                <a:spLocks noGrp="1"/>
+              </p:cNvSpPr>
+              <p:nvPr>
+                <p:ph type="title"/>
+              </p:nvPr>
+            </p:nvSpPr>
+            <p:spPr/>
+            <p:txBody>
+              <a:bodyPr/>
+              <a:lstStyle/>
+              <a:p>
+                <a:r>
+                  <a:rPr lang="en-AU" dirty="0"/>
+                  <a:t>Single Event Sensitivity of </a:t>
+                </a:r>
+                <a14:m>
+                  <m:oMath xmlns:m="http://schemas.openxmlformats.org/officeDocument/2006/math">
+                    <m:sSup>
+                      <m:sSupPr>
+                        <m:ctrlPr>
+                          <a:rPr lang="en-AU" b="0" i="1" smtClean="0">
+                            <a:latin typeface="Cambria Math" panose="02040503050406030204" pitchFamily="18" charset="0"/>
+                          </a:rPr>
+                        </m:ctrlPr>
+                      </m:sSupPr>
+                      <m:e>
+                        <m:r>
+                          <a:rPr lang="en-AU" b="0" i="1" smtClean="0">
+                            <a:latin typeface="Cambria Math" panose="02040503050406030204" pitchFamily="18" charset="0"/>
+                          </a:rPr>
+                          <m:t>𝐵</m:t>
+                        </m:r>
+                      </m:e>
+                      <m:sup>
+                        <m:r>
+                          <a:rPr lang="en-AU" b="0" i="1" smtClean="0">
+                            <a:latin typeface="Cambria Math" panose="02040503050406030204" pitchFamily="18" charset="0"/>
+                          </a:rPr>
+                          <m:t>0</m:t>
+                        </m:r>
+                      </m:sup>
+                    </m:sSup>
+                    <m:r>
+                      <a:rPr lang="en-AU" b="0" i="1" smtClean="0">
+                        <a:latin typeface="Cambria Math" panose="02040503050406030204" pitchFamily="18" charset="0"/>
+                      </a:rPr>
+                      <m:t>→</m:t>
+                    </m:r>
+                    <m:sSup>
+                      <m:sSupPr>
+                        <m:ctrlPr>
+                          <a:rPr lang="en-AU" b="0" i="1" smtClean="0">
+                            <a:latin typeface="Cambria Math" panose="02040503050406030204" pitchFamily="18" charset="0"/>
+                          </a:rPr>
+                        </m:ctrlPr>
+                      </m:sSupPr>
+                      <m:e>
+                        <m:r>
+                          <a:rPr lang="en-AU" b="0" i="1" smtClean="0">
+                            <a:latin typeface="Cambria Math" panose="02040503050406030204" pitchFamily="18" charset="0"/>
+                          </a:rPr>
+                          <m:t>𝐾</m:t>
+                        </m:r>
+                      </m:e>
+                      <m:sup>
+                        <m:r>
+                          <a:rPr lang="en-AU" b="0" i="1" smtClean="0">
+                            <a:latin typeface="Cambria Math" panose="02040503050406030204" pitchFamily="18" charset="0"/>
+                          </a:rPr>
+                          <m:t>0∗</m:t>
+                        </m:r>
+                      </m:sup>
+                    </m:sSup>
+                    <m:r>
+                      <a:rPr lang="en-AU" b="0" i="1" smtClean="0">
+                        <a:latin typeface="Cambria Math" panose="02040503050406030204" pitchFamily="18" charset="0"/>
+                      </a:rPr>
+                      <m:t>𝛾</m:t>
+                    </m:r>
+                  </m:oMath>
+                </a14:m>
+                <a:endParaRPr lang="en-AU" dirty="0"/>
+              </a:p>
+            </p:txBody>
+          </p:sp>
+        </mc:Choice>
+        <mc:Fallback>
+          <p:sp>
+            <p:nvSpPr>
+              <p:cNvPr id="2" name="Title 1">
+                <a:extLst>
+                  <a:ext uri="{FF2B5EF4-FFF2-40B4-BE49-F238E27FC236}">
+                    <a16:creationId xmlns:a16="http://schemas.microsoft.com/office/drawing/2014/main" id="{A242D612-5768-22B7-1794-2D1F7611D9DD}"/>
+                  </a:ext>
+                </a:extLst>
+              </p:cNvPr>
+              <p:cNvSpPr>
+                <a:spLocks noGrp="1" noRot="1" noChangeAspect="1" noMove="1" noResize="1" noEditPoints="1" noAdjustHandles="1" noChangeArrowheads="1" noChangeShapeType="1" noTextEdit="1"/>
+              </p:cNvSpPr>
+              <p:nvPr>
+                <p:ph type="title"/>
+              </p:nvPr>
+            </p:nvSpPr>
+            <p:spPr>
+              <a:blipFill>
+                <a:blip r:embed="rId2"/>
+                <a:stretch>
+                  <a:fillRect l="-2377"/>
+                </a:stretch>
+              </a:blipFill>
+            </p:spPr>
+            <p:txBody>
+              <a:bodyPr/>
+              <a:lstStyle/>
+              <a:p>
+                <a:r>
+                  <a:rPr lang="en-AU">
+                    <a:noFill/>
+                  </a:rPr>
+                  <a:t> </a:t>
+                </a:r>
+              </a:p>
+            </p:txBody>
+          </p:sp>
+        </mc:Fallback>
+      </mc:AlternateContent>
+      <mc:AlternateContent xmlns:mc="http://schemas.openxmlformats.org/markup-compatibility/2006">
+        <mc:Choice xmlns:a14="http://schemas.microsoft.com/office/drawing/2010/main" Requires="a14">
+          <p:sp>
+            <p:nvSpPr>
+              <p:cNvPr id="3" name="Content Placeholder 2">
+                <a:extLst>
+                  <a:ext uri="{FF2B5EF4-FFF2-40B4-BE49-F238E27FC236}">
+                    <a16:creationId xmlns:a16="http://schemas.microsoft.com/office/drawing/2014/main" id="{94EF0DF0-1BA9-67DC-CD3C-9335859F8E7D}"/>
+                  </a:ext>
+                </a:extLst>
+              </p:cNvPr>
+              <p:cNvSpPr>
+                <a:spLocks noGrp="1"/>
+              </p:cNvSpPr>
+              <p:nvPr>
+                <p:ph idx="1"/>
+              </p:nvPr>
+            </p:nvSpPr>
+            <p:spPr/>
+            <p:txBody>
+              <a:bodyPr/>
+              <a:lstStyle/>
+              <a:p>
+                <a:r>
+                  <a:rPr lang="en-AU" dirty="0"/>
+                  <a:t>Defined as the “branching ratio for 1 event of the desired type”</a:t>
+                </a:r>
+              </a:p>
+              <a:p>
+                <a:r>
+                  <a:rPr lang="en-AU" dirty="0"/>
+                  <a:t>World average for </a:t>
+                </a:r>
+                <a14:m>
+                  <m:oMath xmlns:m="http://schemas.openxmlformats.org/officeDocument/2006/math">
+                    <m:r>
+                      <a:rPr lang="en-AU" b="0" i="1" smtClean="0">
+                        <a:latin typeface="Cambria Math" panose="02040503050406030204" pitchFamily="18" charset="0"/>
+                      </a:rPr>
+                      <m:t>𝐵𝑅</m:t>
+                    </m:r>
+                    <m:d>
+                      <m:dPr>
+                        <m:ctrlPr>
+                          <a:rPr lang="en-AU" b="0" i="1" smtClean="0">
+                            <a:latin typeface="Cambria Math" panose="02040503050406030204" pitchFamily="18" charset="0"/>
+                          </a:rPr>
+                        </m:ctrlPr>
+                      </m:dPr>
+                      <m:e>
+                        <m:sSup>
+                          <m:sSupPr>
+                            <m:ctrlPr>
+                              <a:rPr lang="en-AU" i="1" smtClean="0">
+                                <a:latin typeface="Cambria Math" panose="02040503050406030204" pitchFamily="18" charset="0"/>
+                              </a:rPr>
+                            </m:ctrlPr>
+                          </m:sSupPr>
+                          <m:e>
+                            <m:r>
+                              <a:rPr lang="en-AU" b="0" i="1" smtClean="0">
+                                <a:latin typeface="Cambria Math" panose="02040503050406030204" pitchFamily="18" charset="0"/>
+                              </a:rPr>
+                              <m:t>𝐵</m:t>
+                            </m:r>
+                          </m:e>
+                          <m:sup>
+                            <m:r>
+                              <a:rPr lang="en-AU" b="0" i="1" smtClean="0">
+                                <a:latin typeface="Cambria Math" panose="02040503050406030204" pitchFamily="18" charset="0"/>
+                              </a:rPr>
+                              <m:t>0</m:t>
+                            </m:r>
+                          </m:sup>
+                        </m:sSup>
+                        <m:r>
+                          <a:rPr lang="en-AU" b="0" i="1" smtClean="0">
+                            <a:latin typeface="Cambria Math" panose="02040503050406030204" pitchFamily="18" charset="0"/>
+                          </a:rPr>
+                          <m:t>→</m:t>
+                        </m:r>
+                        <m:sSup>
+                          <m:sSupPr>
+                            <m:ctrlPr>
+                              <a:rPr lang="en-AU" i="1" smtClean="0">
+                                <a:latin typeface="Cambria Math" panose="02040503050406030204" pitchFamily="18" charset="0"/>
+                              </a:rPr>
+                            </m:ctrlPr>
+                          </m:sSupPr>
+                          <m:e>
+                            <m:r>
+                              <a:rPr lang="en-AU" b="0" i="1" smtClean="0">
+                                <a:latin typeface="Cambria Math" panose="02040503050406030204" pitchFamily="18" charset="0"/>
+                              </a:rPr>
+                              <m:t>𝐾</m:t>
+                            </m:r>
+                          </m:e>
+                          <m:sup>
+                            <m:r>
+                              <a:rPr lang="en-AU" b="0" i="1" smtClean="0">
+                                <a:latin typeface="Cambria Math" panose="02040503050406030204" pitchFamily="18" charset="0"/>
+                              </a:rPr>
+                              <m:t>∗0</m:t>
+                            </m:r>
+                          </m:sup>
+                        </m:sSup>
+                        <m:r>
+                          <a:rPr lang="en-AU" b="0" i="1" smtClean="0">
+                            <a:latin typeface="Cambria Math" panose="02040503050406030204" pitchFamily="18" charset="0"/>
+                          </a:rPr>
+                          <m:t>𝛾</m:t>
+                        </m:r>
+                      </m:e>
+                    </m:d>
+                    <m:r>
+                      <a:rPr lang="en-AU" b="0" i="0" smtClean="0">
+                        <a:latin typeface="Cambria Math" panose="02040503050406030204" pitchFamily="18" charset="0"/>
+                      </a:rPr>
+                      <m:t>=</m:t>
+                    </m:r>
+                    <m:d>
+                      <m:dPr>
+                        <m:ctrlPr>
+                          <a:rPr lang="en-AU" b="0" i="1" smtClean="0">
+                            <a:latin typeface="Cambria Math" panose="02040503050406030204" pitchFamily="18" charset="0"/>
+                          </a:rPr>
+                        </m:ctrlPr>
+                      </m:dPr>
+                      <m:e>
+                        <m:r>
+                          <a:rPr lang="en-AU" b="0" i="0" smtClean="0">
+                            <a:latin typeface="Cambria Math" panose="02040503050406030204" pitchFamily="18" charset="0"/>
+                          </a:rPr>
+                          <m:t>4.33</m:t>
+                        </m:r>
+                        <m:r>
+                          <a:rPr lang="en-AU" b="0" i="1" smtClean="0">
+                            <a:latin typeface="Cambria Math" panose="02040503050406030204" pitchFamily="18" charset="0"/>
+                          </a:rPr>
+                          <m:t>±0.15</m:t>
+                        </m:r>
+                      </m:e>
+                    </m:d>
+                    <m:r>
+                      <a:rPr lang="en-AU" b="0" i="1" smtClean="0">
+                        <a:latin typeface="Cambria Math" panose="02040503050406030204" pitchFamily="18" charset="0"/>
+                      </a:rPr>
+                      <m:t>×</m:t>
+                    </m:r>
+                    <m:sSup>
+                      <m:sSupPr>
+                        <m:ctrlPr>
+                          <a:rPr lang="en-AU" b="0" i="1" smtClean="0">
+                            <a:latin typeface="Cambria Math" panose="02040503050406030204" pitchFamily="18" charset="0"/>
+                          </a:rPr>
+                        </m:ctrlPr>
+                      </m:sSupPr>
+                      <m:e>
+                        <m:r>
+                          <a:rPr lang="en-AU" b="0" i="1" smtClean="0">
+                            <a:latin typeface="Cambria Math" panose="02040503050406030204" pitchFamily="18" charset="0"/>
+                          </a:rPr>
+                          <m:t>10</m:t>
+                        </m:r>
+                      </m:e>
+                      <m:sup>
+                        <m:r>
+                          <a:rPr lang="en-AU" b="0" i="1" smtClean="0">
+                            <a:latin typeface="Cambria Math" panose="02040503050406030204" pitchFamily="18" charset="0"/>
+                          </a:rPr>
+                          <m:t>−5</m:t>
+                        </m:r>
+                      </m:sup>
+                    </m:sSup>
+                  </m:oMath>
+                </a14:m>
+                <a:r>
+                  <a:rPr lang="en-AU" dirty="0"/>
+                  <a:t> (</a:t>
+                </a:r>
+                <a:r>
+                  <a:rPr lang="en-AU" dirty="0">
+                    <a:hlinkClick r:id="rId3"/>
+                  </a:rPr>
+                  <a:t>http://arxiv.org/abs/1209.0313</a:t>
+                </a:r>
+                <a:r>
+                  <a:rPr lang="en-AU" dirty="0"/>
+                  <a:t>) </a:t>
+                </a:r>
+              </a:p>
+              <a:p>
+                <a14:m>
+                  <m:oMath xmlns:m="http://schemas.openxmlformats.org/officeDocument/2006/math">
+                    <m:sSub>
+                      <m:sSubPr>
+                        <m:ctrlPr>
+                          <a:rPr lang="en-AU" b="0" i="1" smtClean="0">
+                            <a:latin typeface="Cambria Math" panose="02040503050406030204" pitchFamily="18" charset="0"/>
+                          </a:rPr>
+                        </m:ctrlPr>
+                      </m:sSubPr>
+                      <m:e>
+                        <m:r>
+                          <a:rPr lang="en-AU" b="0" i="1" smtClean="0">
+                            <a:latin typeface="Cambria Math" panose="02040503050406030204" pitchFamily="18" charset="0"/>
+                          </a:rPr>
+                          <m:t>𝑁</m:t>
+                        </m:r>
+                      </m:e>
+                      <m:sub>
+                        <m:r>
+                          <a:rPr lang="en-AU" b="0" i="1" smtClean="0">
+                            <a:latin typeface="Cambria Math" panose="02040503050406030204" pitchFamily="18" charset="0"/>
+                          </a:rPr>
+                          <m:t>𝐵</m:t>
+                        </m:r>
+                        <m:r>
+                          <a:rPr lang="en-AU" b="0" i="1" smtClean="0">
+                            <a:latin typeface="Cambria Math" panose="02040503050406030204" pitchFamily="18" charset="0"/>
+                          </a:rPr>
+                          <m:t>→</m:t>
+                        </m:r>
+                        <m:sSup>
+                          <m:sSupPr>
+                            <m:ctrlPr>
+                              <a:rPr lang="en-AU" b="0" i="1" smtClean="0">
+                                <a:latin typeface="Cambria Math" panose="02040503050406030204" pitchFamily="18" charset="0"/>
+                              </a:rPr>
+                            </m:ctrlPr>
+                          </m:sSupPr>
+                          <m:e>
+                            <m:r>
+                              <a:rPr lang="en-AU" b="0" i="1" smtClean="0">
+                                <a:latin typeface="Cambria Math" panose="02040503050406030204" pitchFamily="18" charset="0"/>
+                              </a:rPr>
+                              <m:t>𝐾</m:t>
+                            </m:r>
+                          </m:e>
+                          <m:sup>
+                            <m:r>
+                              <a:rPr lang="en-AU" b="0" i="1" smtClean="0">
+                                <a:latin typeface="Cambria Math" panose="02040503050406030204" pitchFamily="18" charset="0"/>
+                              </a:rPr>
+                              <m:t>∗</m:t>
+                            </m:r>
+                          </m:sup>
+                        </m:sSup>
+                        <m:r>
+                          <a:rPr lang="en-AU" b="0" i="1" smtClean="0">
+                            <a:latin typeface="Cambria Math" panose="02040503050406030204" pitchFamily="18" charset="0"/>
+                          </a:rPr>
+                          <m:t>𝛾</m:t>
+                        </m:r>
+                      </m:sub>
+                    </m:sSub>
+                    <m:r>
+                      <a:rPr lang="en-AU" b="0" i="1" smtClean="0">
+                        <a:latin typeface="Cambria Math" panose="02040503050406030204" pitchFamily="18" charset="0"/>
+                      </a:rPr>
+                      <m:t>=5279±93</m:t>
+                    </m:r>
+                  </m:oMath>
+                </a14:m>
+                <a:r>
+                  <a:rPr lang="en-AU" b="0" dirty="0"/>
+                  <a:t> (</a:t>
+                </a:r>
+                <a:r>
+                  <a:rPr lang="en-AU" dirty="0"/>
+                  <a:t>(</a:t>
+                </a:r>
+                <a:r>
+                  <a:rPr lang="en-AU" dirty="0">
+                    <a:hlinkClick r:id="rId3"/>
+                  </a:rPr>
+                  <a:t>http://arxiv.org/abs/1209.0313</a:t>
+                </a:r>
+                <a:r>
+                  <a:rPr lang="en-AU" dirty="0"/>
+                  <a:t>) </a:t>
+                </a:r>
+              </a:p>
+              <a:p>
+                <a:r>
+                  <a:rPr lang="en-AU" b="0" dirty="0"/>
+                  <a:t>Therefore</a:t>
+                </a:r>
+                <a:r>
+                  <a:rPr lang="en-AU" dirty="0"/>
+                  <a:t>, the single event sensitivity of the decay is given by:</a:t>
+                </a:r>
+              </a:p>
+              <a:p>
+                <a:pPr marL="0" indent="0">
+                  <a:buNone/>
+                </a:pPr>
+                <a14:m>
+                  <m:oMathPara xmlns:m="http://schemas.openxmlformats.org/officeDocument/2006/math">
+                    <m:oMathParaPr>
+                      <m:jc m:val="centerGroup"/>
+                    </m:oMathParaPr>
+                    <m:oMath xmlns:m="http://schemas.openxmlformats.org/officeDocument/2006/math">
+                      <m:r>
+                        <a:rPr lang="en-AU" b="0" i="1" smtClean="0">
+                          <a:latin typeface="Cambria Math" panose="02040503050406030204" pitchFamily="18" charset="0"/>
+                        </a:rPr>
+                        <m:t>𝑆𝐸</m:t>
+                      </m:r>
+                      <m:sSub>
+                        <m:sSubPr>
+                          <m:ctrlPr>
+                            <a:rPr lang="en-AU" b="0" i="1" smtClean="0">
+                              <a:latin typeface="Cambria Math" panose="02040503050406030204" pitchFamily="18" charset="0"/>
+                            </a:rPr>
+                          </m:ctrlPr>
+                        </m:sSubPr>
+                        <m:e>
+                          <m:r>
+                            <a:rPr lang="en-AU" b="0" i="1" smtClean="0">
+                              <a:latin typeface="Cambria Math" panose="02040503050406030204" pitchFamily="18" charset="0"/>
+                            </a:rPr>
+                            <m:t>𝑆</m:t>
+                          </m:r>
+                        </m:e>
+                        <m:sub>
+                          <m:r>
+                            <a:rPr lang="en-AU" b="0" i="1" smtClean="0">
+                              <a:latin typeface="Cambria Math" panose="02040503050406030204" pitchFamily="18" charset="0"/>
+                            </a:rPr>
+                            <m:t>𝐵</m:t>
+                          </m:r>
+                          <m:r>
+                            <a:rPr lang="en-AU" b="0" i="1" smtClean="0">
+                              <a:latin typeface="Cambria Math" panose="02040503050406030204" pitchFamily="18" charset="0"/>
+                            </a:rPr>
+                            <m:t>→</m:t>
+                          </m:r>
+                          <m:sSup>
+                            <m:sSupPr>
+                              <m:ctrlPr>
+                                <a:rPr lang="en-AU" b="0" i="1" smtClean="0">
+                                  <a:latin typeface="Cambria Math" panose="02040503050406030204" pitchFamily="18" charset="0"/>
+                                </a:rPr>
+                              </m:ctrlPr>
+                            </m:sSupPr>
+                            <m:e>
+                              <m:r>
+                                <a:rPr lang="en-AU" b="0" i="1" smtClean="0">
+                                  <a:latin typeface="Cambria Math" panose="02040503050406030204" pitchFamily="18" charset="0"/>
+                                </a:rPr>
+                                <m:t>𝐾</m:t>
+                              </m:r>
+                            </m:e>
+                            <m:sup>
+                              <m:r>
+                                <a:rPr lang="en-AU" b="0" i="1" smtClean="0">
+                                  <a:latin typeface="Cambria Math" panose="02040503050406030204" pitchFamily="18" charset="0"/>
+                                </a:rPr>
+                                <m:t>∗</m:t>
+                              </m:r>
+                            </m:sup>
+                          </m:sSup>
+                          <m:r>
+                            <a:rPr lang="en-AU" b="0" i="1" smtClean="0">
+                              <a:latin typeface="Cambria Math" panose="02040503050406030204" pitchFamily="18" charset="0"/>
+                            </a:rPr>
+                            <m:t>𝛾</m:t>
+                          </m:r>
+                        </m:sub>
+                      </m:sSub>
+                      <m:r>
+                        <a:rPr lang="en-AU" b="0" i="1" smtClean="0">
+                          <a:latin typeface="Cambria Math" panose="02040503050406030204" pitchFamily="18" charset="0"/>
+                        </a:rPr>
+                        <m:t>=</m:t>
+                      </m:r>
+                      <m:f>
+                        <m:fPr>
+                          <m:ctrlPr>
+                            <a:rPr lang="en-AU" b="0" i="1" smtClean="0">
+                              <a:latin typeface="Cambria Math" panose="02040503050406030204" pitchFamily="18" charset="0"/>
+                            </a:rPr>
+                          </m:ctrlPr>
+                        </m:fPr>
+                        <m:num>
+                          <m:d>
+                            <m:dPr>
+                              <m:ctrlPr>
+                                <a:rPr lang="en-AU" b="0" i="1" smtClean="0">
+                                  <a:latin typeface="Cambria Math" panose="02040503050406030204" pitchFamily="18" charset="0"/>
+                                </a:rPr>
+                              </m:ctrlPr>
+                            </m:dPr>
+                            <m:e>
+                              <m:r>
+                                <a:rPr lang="en-AU" b="0" i="1" smtClean="0">
+                                  <a:latin typeface="Cambria Math" panose="02040503050406030204" pitchFamily="18" charset="0"/>
+                                </a:rPr>
+                                <m:t>4.33±0.15</m:t>
+                              </m:r>
+                            </m:e>
+                          </m:d>
+                          <m:r>
+                            <a:rPr lang="en-AU" b="0" i="1" smtClean="0">
+                              <a:latin typeface="Cambria Math" panose="02040503050406030204" pitchFamily="18" charset="0"/>
+                            </a:rPr>
+                            <m:t>×</m:t>
+                          </m:r>
+                          <m:sSup>
+                            <m:sSupPr>
+                              <m:ctrlPr>
+                                <a:rPr lang="en-AU" b="0" i="1" smtClean="0">
+                                  <a:latin typeface="Cambria Math" panose="02040503050406030204" pitchFamily="18" charset="0"/>
+                                </a:rPr>
+                              </m:ctrlPr>
+                            </m:sSupPr>
+                            <m:e>
+                              <m:r>
+                                <a:rPr lang="en-AU" b="0" i="1" smtClean="0">
+                                  <a:latin typeface="Cambria Math" panose="02040503050406030204" pitchFamily="18" charset="0"/>
+                                </a:rPr>
+                                <m:t>10</m:t>
+                              </m:r>
+                            </m:e>
+                            <m:sup>
+                              <m:r>
+                                <a:rPr lang="en-AU" b="0" i="1" smtClean="0">
+                                  <a:latin typeface="Cambria Math" panose="02040503050406030204" pitchFamily="18" charset="0"/>
+                                </a:rPr>
+                                <m:t>−5</m:t>
+                              </m:r>
+                            </m:sup>
+                          </m:sSup>
+                        </m:num>
+                        <m:den>
+                          <m:r>
+                            <a:rPr lang="en-AU" b="0" i="1" smtClean="0">
+                              <a:latin typeface="Cambria Math" panose="02040503050406030204" pitchFamily="18" charset="0"/>
+                            </a:rPr>
+                            <m:t>5279±93</m:t>
+                          </m:r>
+                        </m:den>
+                      </m:f>
+                      <m:r>
+                        <a:rPr lang="en-AU" b="0" i="1" smtClean="0">
+                          <a:latin typeface="Cambria Math" panose="02040503050406030204" pitchFamily="18" charset="0"/>
+                        </a:rPr>
+                        <m:t>≈</m:t>
+                      </m:r>
+                      <m:d>
+                        <m:dPr>
+                          <m:ctrlPr>
+                            <a:rPr lang="en-AU" b="0" i="1" smtClean="0">
+                              <a:latin typeface="Cambria Math" panose="02040503050406030204" pitchFamily="18" charset="0"/>
+                            </a:rPr>
+                          </m:ctrlPr>
+                        </m:dPr>
+                        <m:e>
+                          <m:r>
+                            <a:rPr lang="en-AU" b="0" i="1" smtClean="0">
+                              <a:latin typeface="Cambria Math" panose="02040503050406030204" pitchFamily="18" charset="0"/>
+                            </a:rPr>
+                            <m:t>8.20±0.42</m:t>
+                          </m:r>
+                        </m:e>
+                      </m:d>
+                      <m:r>
+                        <a:rPr lang="en-AU" b="0" i="1" smtClean="0">
+                          <a:latin typeface="Cambria Math" panose="02040503050406030204" pitchFamily="18" charset="0"/>
+                        </a:rPr>
+                        <m:t>×</m:t>
+                      </m:r>
+                      <m:sSup>
+                        <m:sSupPr>
+                          <m:ctrlPr>
+                            <a:rPr lang="en-AU" b="0" i="1" smtClean="0">
+                              <a:latin typeface="Cambria Math" panose="02040503050406030204" pitchFamily="18" charset="0"/>
+                            </a:rPr>
+                          </m:ctrlPr>
+                        </m:sSupPr>
+                        <m:e>
+                          <m:r>
+                            <a:rPr lang="en-AU" b="0" i="1" smtClean="0">
+                              <a:latin typeface="Cambria Math" panose="02040503050406030204" pitchFamily="18" charset="0"/>
+                            </a:rPr>
+                            <m:t>10</m:t>
+                          </m:r>
+                        </m:e>
+                        <m:sup>
+                          <m:r>
+                            <a:rPr lang="en-AU" b="0" i="1" smtClean="0">
+                              <a:latin typeface="Cambria Math" panose="02040503050406030204" pitchFamily="18" charset="0"/>
+                            </a:rPr>
+                            <m:t>−9</m:t>
+                          </m:r>
+                        </m:sup>
+                      </m:sSup>
+                    </m:oMath>
+                  </m:oMathPara>
+                </a14:m>
+                <a:endParaRPr lang="en-AU" b="0" dirty="0"/>
+              </a:p>
+              <a:p>
+                <a:r>
+                  <a:rPr lang="en-AU" dirty="0"/>
+                  <a:t>The above is the branching ratio for one </a:t>
+                </a:r>
+                <a14:m>
+                  <m:oMath xmlns:m="http://schemas.openxmlformats.org/officeDocument/2006/math">
+                    <m:r>
+                      <a:rPr lang="en-AU" b="0" i="1" smtClean="0">
+                        <a:latin typeface="Cambria Math" panose="02040503050406030204" pitchFamily="18" charset="0"/>
+                      </a:rPr>
+                      <m:t>𝐵</m:t>
+                    </m:r>
+                    <m:r>
+                      <a:rPr lang="en-AU" b="0" i="1" smtClean="0">
+                        <a:latin typeface="Cambria Math" panose="02040503050406030204" pitchFamily="18" charset="0"/>
+                      </a:rPr>
+                      <m:t>→</m:t>
+                    </m:r>
+                    <m:sSup>
+                      <m:sSupPr>
+                        <m:ctrlPr>
+                          <a:rPr lang="en-AU" b="0" i="1" smtClean="0">
+                            <a:latin typeface="Cambria Math" panose="02040503050406030204" pitchFamily="18" charset="0"/>
+                          </a:rPr>
+                        </m:ctrlPr>
+                      </m:sSupPr>
+                      <m:e>
+                        <m:r>
+                          <a:rPr lang="en-AU" b="0" i="1" smtClean="0">
+                            <a:latin typeface="Cambria Math" panose="02040503050406030204" pitchFamily="18" charset="0"/>
+                          </a:rPr>
+                          <m:t>𝐾</m:t>
+                        </m:r>
+                      </m:e>
+                      <m:sup>
+                        <m:r>
+                          <a:rPr lang="en-AU" b="0" i="1" smtClean="0">
+                            <a:latin typeface="Cambria Math" panose="02040503050406030204" pitchFamily="18" charset="0"/>
+                          </a:rPr>
+                          <m:t>∗</m:t>
+                        </m:r>
+                      </m:sup>
+                    </m:sSup>
+                    <m:r>
+                      <a:rPr lang="en-AU" b="0" i="1" smtClean="0">
+                        <a:latin typeface="Cambria Math" panose="02040503050406030204" pitchFamily="18" charset="0"/>
+                      </a:rPr>
+                      <m:t>𝛾</m:t>
+                    </m:r>
+                  </m:oMath>
+                </a14:m>
+                <a:r>
+                  <a:rPr lang="en-AU" dirty="0"/>
+                  <a:t> event</a:t>
+                </a:r>
+              </a:p>
+              <a:p>
+                <a:endParaRPr lang="en-AU" dirty="0"/>
+              </a:p>
+              <a:p>
+                <a:endParaRPr lang="en-AU" dirty="0"/>
+              </a:p>
+            </p:txBody>
+          </p:sp>
+        </mc:Choice>
+        <mc:Fallback>
+          <p:sp>
+            <p:nvSpPr>
+              <p:cNvPr id="3" name="Content Placeholder 2">
+                <a:extLst>
+                  <a:ext uri="{FF2B5EF4-FFF2-40B4-BE49-F238E27FC236}">
+                    <a16:creationId xmlns:a16="http://schemas.microsoft.com/office/drawing/2014/main" id="{94EF0DF0-1BA9-67DC-CD3C-9335859F8E7D}"/>
+                  </a:ext>
+                </a:extLst>
+              </p:cNvPr>
+              <p:cNvSpPr>
+                <a:spLocks noGrp="1" noRot="1" noChangeAspect="1" noMove="1" noResize="1" noEditPoints="1" noAdjustHandles="1" noChangeArrowheads="1" noChangeShapeType="1" noTextEdit="1"/>
+              </p:cNvSpPr>
+              <p:nvPr>
+                <p:ph idx="1"/>
+              </p:nvPr>
+            </p:nvSpPr>
+            <p:spPr>
+              <a:blipFill>
+                <a:blip r:embed="rId4"/>
+                <a:stretch>
+                  <a:fillRect l="-1043" t="-2241"/>
+                </a:stretch>
+              </a:blipFill>
+            </p:spPr>
+            <p:txBody>
+              <a:bodyPr/>
+              <a:lstStyle/>
+              <a:p>
+                <a:r>
+                  <a:rPr lang="en-AU">
+                    <a:noFill/>
+                  </a:rPr>
+                  <a:t> </a:t>
+                </a:r>
+              </a:p>
+            </p:txBody>
+          </p:sp>
+        </mc:Fallback>
+      </mc:AlternateContent>
+    </p:spTree>
+    <p:extLst>
+      <p:ext uri="{BB962C8B-B14F-4D97-AF65-F5344CB8AC3E}">
+        <p14:creationId xmlns:p14="http://schemas.microsoft.com/office/powerpoint/2010/main" val="2927900761"/>
       </p:ext>
     </p:extLst>
   </p:cSld>
@@ -8216,4 +9674,299 @@
     </a:ext>
   </a:extLst>
 </a:theme>
+</file>
+
+<file path=ppt/theme/theme2.xml><?xml version="1.0" encoding="utf-8"?>
+<a:theme xmlns:a="http://schemas.openxmlformats.org/drawingml/2006/main" name="Office Theme">
+  <a:themeElements>
+    <a:clrScheme name="Office">
+      <a:dk1>
+        <a:sysClr val="windowText" lastClr="000000"/>
+      </a:dk1>
+      <a:lt1>
+        <a:sysClr val="window" lastClr="FFFFFF"/>
+      </a:lt1>
+      <a:dk2>
+        <a:srgbClr val="44546A"/>
+      </a:dk2>
+      <a:lt2>
+        <a:srgbClr val="E7E6E6"/>
+      </a:lt2>
+      <a:accent1>
+        <a:srgbClr val="4472C4"/>
+      </a:accent1>
+      <a:accent2>
+        <a:srgbClr val="ED7D31"/>
+      </a:accent2>
+      <a:accent3>
+        <a:srgbClr val="A5A5A5"/>
+      </a:accent3>
+      <a:accent4>
+        <a:srgbClr val="FFC000"/>
+      </a:accent4>
+      <a:accent5>
+        <a:srgbClr val="5B9BD5"/>
+      </a:accent5>
+      <a:accent6>
+        <a:srgbClr val="70AD47"/>
+      </a:accent6>
+      <a:hlink>
+        <a:srgbClr val="0563C1"/>
+      </a:hlink>
+      <a:folHlink>
+        <a:srgbClr val="954F72"/>
+      </a:folHlink>
+    </a:clrScheme>
+    <a:fontScheme name="Office">
+      <a:majorFont>
+        <a:latin typeface="Calibri Light" panose="020F0302020204030204"/>
+        <a:ea typeface=""/>
+        <a:cs typeface=""/>
+        <a:font script="Jpan" typeface="游ゴシック Light"/>
+        <a:font script="Hang" typeface="맑은 고딕"/>
+        <a:font script="Hans" typeface="等线 Light"/>
+        <a:font script="Hant" typeface="新細明體"/>
+        <a:font script="Arab" typeface="Times New Roman"/>
+        <a:font script="Hebr" typeface="Times New Roman"/>
+        <a:font script="Thai" typeface="Angsana New"/>
+        <a:font script="Ethi" typeface="Nyala"/>
+        <a:font script="Beng" typeface="Vrinda"/>
+        <a:font script="Gujr" typeface="Shruti"/>
+        <a:font script="Khmr" typeface="MoolBoran"/>
+        <a:font script="Knda" typeface="Tunga"/>
+        <a:font script="Guru" typeface="Raavi"/>
+        <a:font script="Cans" typeface="Euphemia"/>
+        <a:font script="Cher" typeface="Plantagenet Cherokee"/>
+        <a:font script="Yiii" typeface="Microsoft Yi Baiti"/>
+        <a:font script="Tibt" typeface="Microsoft Himalaya"/>
+        <a:font script="Thaa" typeface="MV Boli"/>
+        <a:font script="Deva" typeface="Mangal"/>
+        <a:font script="Telu" typeface="Gautami"/>
+        <a:font script="Taml" typeface="Latha"/>
+        <a:font script="Syrc" typeface="Estrangelo Edessa"/>
+        <a:font script="Orya" typeface="Kalinga"/>
+        <a:font script="Mlym" typeface="Kartika"/>
+        <a:font script="Laoo" typeface="DokChampa"/>
+        <a:font script="Sinh" typeface="Iskoola Pota"/>
+        <a:font script="Mong" typeface="Mongolian Baiti"/>
+        <a:font script="Viet" typeface="Times New Roman"/>
+        <a:font script="Uigh" typeface="Microsoft Uighur"/>
+        <a:font script="Geor" typeface="Sylfaen"/>
+        <a:font script="Armn" typeface="Arial"/>
+        <a:font script="Bugi" typeface="Leelawadee UI"/>
+        <a:font script="Bopo" typeface="Microsoft JhengHei"/>
+        <a:font script="Java" typeface="Javanese Text"/>
+        <a:font script="Lisu" typeface="Segoe UI"/>
+        <a:font script="Mymr" typeface="Myanmar Text"/>
+        <a:font script="Nkoo" typeface="Ebrima"/>
+        <a:font script="Olck" typeface="Nirmala UI"/>
+        <a:font script="Osma" typeface="Ebrima"/>
+        <a:font script="Phag" typeface="Phagspa"/>
+        <a:font script="Syrn" typeface="Estrangelo Edessa"/>
+        <a:font script="Syrj" typeface="Estrangelo Edessa"/>
+        <a:font script="Syre" typeface="Estrangelo Edessa"/>
+        <a:font script="Sora" typeface="Nirmala UI"/>
+        <a:font script="Tale" typeface="Microsoft Tai Le"/>
+        <a:font script="Talu" typeface="Microsoft New Tai Lue"/>
+        <a:font script="Tfng" typeface="Ebrima"/>
+      </a:majorFont>
+      <a:minorFont>
+        <a:latin typeface="Calibri" panose="020F0502020204030204"/>
+        <a:ea typeface=""/>
+        <a:cs typeface=""/>
+        <a:font script="Jpan" typeface="游ゴシック"/>
+        <a:font script="Hang" typeface="맑은 고딕"/>
+        <a:font script="Hans" typeface="等线"/>
+        <a:font script="Hant" typeface="新細明體"/>
+        <a:font script="Arab" typeface="Arial"/>
+        <a:font script="Hebr" typeface="Arial"/>
+        <a:font script="Thai" typeface="Cordia New"/>
+        <a:font script="Ethi" typeface="Nyala"/>
+        <a:font script="Beng" typeface="Vrinda"/>
+        <a:font script="Gujr" typeface="Shruti"/>
+        <a:font script="Khmr" typeface="DaunPenh"/>
+        <a:font script="Knda" typeface="Tunga"/>
+        <a:font script="Guru" typeface="Raavi"/>
+        <a:font script="Cans" typeface="Euphemia"/>
+        <a:font script="Cher" typeface="Plantagenet Cherokee"/>
+        <a:font script="Yiii" typeface="Microsoft Yi Baiti"/>
+        <a:font script="Tibt" typeface="Microsoft Himalaya"/>
+        <a:font script="Thaa" typeface="MV Boli"/>
+        <a:font script="Deva" typeface="Mangal"/>
+        <a:font script="Telu" typeface="Gautami"/>
+        <a:font script="Taml" typeface="Latha"/>
+        <a:font script="Syrc" typeface="Estrangelo Edessa"/>
+        <a:font script="Orya" typeface="Kalinga"/>
+        <a:font script="Mlym" typeface="Kartika"/>
+        <a:font script="Laoo" typeface="DokChampa"/>
+        <a:font script="Sinh" typeface="Iskoola Pota"/>
+        <a:font script="Mong" typeface="Mongolian Baiti"/>
+        <a:font script="Viet" typeface="Arial"/>
+        <a:font script="Uigh" typeface="Microsoft Uighur"/>
+        <a:font script="Geor" typeface="Sylfaen"/>
+        <a:font script="Armn" typeface="Arial"/>
+        <a:font script="Bugi" typeface="Leelawadee UI"/>
+        <a:font script="Bopo" typeface="Microsoft JhengHei"/>
+        <a:font script="Java" typeface="Javanese Text"/>
+        <a:font script="Lisu" typeface="Segoe UI"/>
+        <a:font script="Mymr" typeface="Myanmar Text"/>
+        <a:font script="Nkoo" typeface="Ebrima"/>
+        <a:font script="Olck" typeface="Nirmala UI"/>
+        <a:font script="Osma" typeface="Ebrima"/>
+        <a:font script="Phag" typeface="Phagspa"/>
+        <a:font script="Syrn" typeface="Estrangelo Edessa"/>
+        <a:font script="Syrj" typeface="Estrangelo Edessa"/>
+        <a:font script="Syre" typeface="Estrangelo Edessa"/>
+        <a:font script="Sora" typeface="Nirmala UI"/>
+        <a:font script="Tale" typeface="Microsoft Tai Le"/>
+        <a:font script="Talu" typeface="Microsoft New Tai Lue"/>
+        <a:font script="Tfng" typeface="Ebrima"/>
+      </a:minorFont>
+    </a:fontScheme>
+    <a:fmtScheme name="Office">
+      <a:fillStyleLst>
+        <a:solidFill>
+          <a:schemeClr val="phClr"/>
+        </a:solidFill>
+        <a:gradFill rotWithShape="1">
+          <a:gsLst>
+            <a:gs pos="0">
+              <a:schemeClr val="phClr">
+                <a:lumMod val="110000"/>
+                <a:satMod val="105000"/>
+                <a:tint val="67000"/>
+              </a:schemeClr>
+            </a:gs>
+            <a:gs pos="50000">
+              <a:schemeClr val="phClr">
+                <a:lumMod val="105000"/>
+                <a:satMod val="103000"/>
+                <a:tint val="73000"/>
+              </a:schemeClr>
+            </a:gs>
+            <a:gs pos="100000">
+              <a:schemeClr val="phClr">
+                <a:lumMod val="105000"/>
+                <a:satMod val="109000"/>
+                <a:tint val="81000"/>
+              </a:schemeClr>
+            </a:gs>
+          </a:gsLst>
+          <a:lin ang="5400000" scaled="0"/>
+        </a:gradFill>
+        <a:gradFill rotWithShape="1">
+          <a:gsLst>
+            <a:gs pos="0">
+              <a:schemeClr val="phClr">
+                <a:satMod val="103000"/>
+                <a:lumMod val="102000"/>
+                <a:tint val="94000"/>
+              </a:schemeClr>
+            </a:gs>
+            <a:gs pos="50000">
+              <a:schemeClr val="phClr">
+                <a:satMod val="110000"/>
+                <a:lumMod val="100000"/>
+                <a:shade val="100000"/>
+              </a:schemeClr>
+            </a:gs>
+            <a:gs pos="100000">
+              <a:schemeClr val="phClr">
+                <a:lumMod val="99000"/>
+                <a:satMod val="120000"/>
+                <a:shade val="78000"/>
+              </a:schemeClr>
+            </a:gs>
+          </a:gsLst>
+          <a:lin ang="5400000" scaled="0"/>
+        </a:gradFill>
+      </a:fillStyleLst>
+      <a:lnStyleLst>
+        <a:ln w="6350" cap="flat" cmpd="sng" algn="ctr">
+          <a:solidFill>
+            <a:schemeClr val="phClr"/>
+          </a:solidFill>
+          <a:prstDash val="solid"/>
+          <a:miter lim="800000"/>
+        </a:ln>
+        <a:ln w="12700" cap="flat" cmpd="sng" algn="ctr">
+          <a:solidFill>
+            <a:schemeClr val="phClr"/>
+          </a:solidFill>
+          <a:prstDash val="solid"/>
+          <a:miter lim="800000"/>
+        </a:ln>
+        <a:ln w="19050" cap="flat" cmpd="sng" algn="ctr">
+          <a:solidFill>
+            <a:schemeClr val="phClr"/>
+          </a:solidFill>
+          <a:prstDash val="solid"/>
+          <a:miter lim="800000"/>
+        </a:ln>
+      </a:lnStyleLst>
+      <a:effectStyleLst>
+        <a:effectStyle>
+          <a:effectLst/>
+        </a:effectStyle>
+        <a:effectStyle>
+          <a:effectLst/>
+        </a:effectStyle>
+        <a:effectStyle>
+          <a:effectLst>
+            <a:outerShdw blurRad="57150" dist="19050" dir="5400000" algn="ctr" rotWithShape="0">
+              <a:srgbClr val="000000">
+                <a:alpha val="63000"/>
+              </a:srgbClr>
+            </a:outerShdw>
+          </a:effectLst>
+        </a:effectStyle>
+      </a:effectStyleLst>
+      <a:bgFillStyleLst>
+        <a:solidFill>
+          <a:schemeClr val="phClr"/>
+        </a:solidFill>
+        <a:solidFill>
+          <a:schemeClr val="phClr">
+            <a:tint val="95000"/>
+            <a:satMod val="170000"/>
+          </a:schemeClr>
+        </a:solidFill>
+        <a:gradFill rotWithShape="1">
+          <a:gsLst>
+            <a:gs pos="0">
+              <a:schemeClr val="phClr">
+                <a:tint val="93000"/>
+                <a:satMod val="150000"/>
+                <a:shade val="98000"/>
+                <a:lumMod val="102000"/>
+              </a:schemeClr>
+            </a:gs>
+            <a:gs pos="50000">
+              <a:schemeClr val="phClr">
+                <a:tint val="98000"/>
+                <a:satMod val="130000"/>
+                <a:shade val="90000"/>
+                <a:lumMod val="103000"/>
+              </a:schemeClr>
+            </a:gs>
+            <a:gs pos="100000">
+              <a:schemeClr val="phClr">
+                <a:shade val="63000"/>
+                <a:satMod val="120000"/>
+              </a:schemeClr>
+            </a:gs>
+          </a:gsLst>
+          <a:lin ang="5400000" scaled="0"/>
+        </a:gradFill>
+      </a:bgFillStyleLst>
+    </a:fmtScheme>
+  </a:themeElements>
+  <a:objectDefaults/>
+  <a:extraClrSchemeLst/>
+  <a:extLst>
+    <a:ext uri="{05A4C25C-085E-4340-85A3-A5531E510DB2}">
+      <thm15:themeFamily xmlns:thm15="http://schemas.microsoft.com/office/thememl/2012/main" name="Office Theme" id="{62F939B6-93AF-4DB8-9C6B-D6C7DFDC589F}" vid="{4A3C46E8-61CC-4603-A589-7422A47A8E4A}"/>
+    </a:ext>
+  </a:extLst>
+</a:theme>
 </file>
</xml_diff>

<commit_message>
Added git tutorial notes and updated Lit Rev notes
</commit_message>
<xml_diff>
--- a/Research_Project/LHCb Starterkit/MSc Research Project Progress 31 Aug 2022.pptx
+++ b/Research_Project/LHCb Starterkit/MSc Research Project Progress 31 Aug 2022.pptx
@@ -201,7 +201,7 @@
           <a:p>
             <a:fld id="{FC50BE67-3C8E-4570-A99E-8EC5CD30FB7F}" type="datetimeFigureOut">
               <a:rPr lang="en-AU" smtClean="0"/>
-              <a:t>7/09/2022</a:t>
+              <a:t>8/09/2022</a:t>
             </a:fld>
             <a:endParaRPr lang="en-AU"/>
           </a:p>
@@ -702,7 +702,7 @@
           <a:p>
             <a:fld id="{6D79F432-8B29-4E94-9828-C190BA0C460D}" type="datetimeFigureOut">
               <a:rPr lang="en-AU" smtClean="0"/>
-              <a:t>7/09/2022</a:t>
+              <a:t>8/09/2022</a:t>
             </a:fld>
             <a:endParaRPr lang="en-AU"/>
           </a:p>
@@ -902,7 +902,7 @@
           <a:p>
             <a:fld id="{6D79F432-8B29-4E94-9828-C190BA0C460D}" type="datetimeFigureOut">
               <a:rPr lang="en-AU" smtClean="0"/>
-              <a:t>7/09/2022</a:t>
+              <a:t>8/09/2022</a:t>
             </a:fld>
             <a:endParaRPr lang="en-AU"/>
           </a:p>
@@ -1112,7 +1112,7 @@
           <a:p>
             <a:fld id="{6D79F432-8B29-4E94-9828-C190BA0C460D}" type="datetimeFigureOut">
               <a:rPr lang="en-AU" smtClean="0"/>
-              <a:t>7/09/2022</a:t>
+              <a:t>8/09/2022</a:t>
             </a:fld>
             <a:endParaRPr lang="en-AU"/>
           </a:p>
@@ -1312,7 +1312,7 @@
           <a:p>
             <a:fld id="{6D79F432-8B29-4E94-9828-C190BA0C460D}" type="datetimeFigureOut">
               <a:rPr lang="en-AU" smtClean="0"/>
-              <a:t>7/09/2022</a:t>
+              <a:t>8/09/2022</a:t>
             </a:fld>
             <a:endParaRPr lang="en-AU"/>
           </a:p>
@@ -1588,7 +1588,7 @@
           <a:p>
             <a:fld id="{6D79F432-8B29-4E94-9828-C190BA0C460D}" type="datetimeFigureOut">
               <a:rPr lang="en-AU" smtClean="0"/>
-              <a:t>7/09/2022</a:t>
+              <a:t>8/09/2022</a:t>
             </a:fld>
             <a:endParaRPr lang="en-AU"/>
           </a:p>
@@ -1856,7 +1856,7 @@
           <a:p>
             <a:fld id="{6D79F432-8B29-4E94-9828-C190BA0C460D}" type="datetimeFigureOut">
               <a:rPr lang="en-AU" smtClean="0"/>
-              <a:t>7/09/2022</a:t>
+              <a:t>8/09/2022</a:t>
             </a:fld>
             <a:endParaRPr lang="en-AU"/>
           </a:p>
@@ -2271,7 +2271,7 @@
           <a:p>
             <a:fld id="{6D79F432-8B29-4E94-9828-C190BA0C460D}" type="datetimeFigureOut">
               <a:rPr lang="en-AU" smtClean="0"/>
-              <a:t>7/09/2022</a:t>
+              <a:t>8/09/2022</a:t>
             </a:fld>
             <a:endParaRPr lang="en-AU"/>
           </a:p>
@@ -2413,7 +2413,7 @@
           <a:p>
             <a:fld id="{6D79F432-8B29-4E94-9828-C190BA0C460D}" type="datetimeFigureOut">
               <a:rPr lang="en-AU" smtClean="0"/>
-              <a:t>7/09/2022</a:t>
+              <a:t>8/09/2022</a:t>
             </a:fld>
             <a:endParaRPr lang="en-AU"/>
           </a:p>
@@ -2526,7 +2526,7 @@
           <a:p>
             <a:fld id="{6D79F432-8B29-4E94-9828-C190BA0C460D}" type="datetimeFigureOut">
               <a:rPr lang="en-AU" smtClean="0"/>
-              <a:t>7/09/2022</a:t>
+              <a:t>8/09/2022</a:t>
             </a:fld>
             <a:endParaRPr lang="en-AU"/>
           </a:p>
@@ -2839,7 +2839,7 @@
           <a:p>
             <a:fld id="{6D79F432-8B29-4E94-9828-C190BA0C460D}" type="datetimeFigureOut">
               <a:rPr lang="en-AU" smtClean="0"/>
-              <a:t>7/09/2022</a:t>
+              <a:t>8/09/2022</a:t>
             </a:fld>
             <a:endParaRPr lang="en-AU"/>
           </a:p>
@@ -3128,7 +3128,7 @@
           <a:p>
             <a:fld id="{6D79F432-8B29-4E94-9828-C190BA0C460D}" type="datetimeFigureOut">
               <a:rPr lang="en-AU" smtClean="0"/>
-              <a:t>7/09/2022</a:t>
+              <a:t>8/09/2022</a:t>
             </a:fld>
             <a:endParaRPr lang="en-AU"/>
           </a:p>
@@ -3371,7 +3371,7 @@
           <a:p>
             <a:fld id="{6D79F432-8B29-4E94-9828-C190BA0C460D}" type="datetimeFigureOut">
               <a:rPr lang="en-AU" smtClean="0"/>
-              <a:t>7/09/2022</a:t>
+              <a:t>8/09/2022</a:t>
             </a:fld>
             <a:endParaRPr lang="en-AU"/>
           </a:p>
@@ -4796,11 +4796,9 @@
                   <a:buAutoNum type="arabicPeriod"/>
                 </a:pPr>
                 <a:r>
-                  <a:rPr lang="en-AU" b="1" dirty="0">
+                  <a:rPr lang="en-AU" dirty="0">
                     <a:solidFill>
-                      <a:schemeClr val="accent2">
-                        <a:lumMod val="75000"/>
-                      </a:schemeClr>
+                      <a:srgbClr val="C00000"/>
                     </a:solidFill>
                   </a:rPr>
                   <a:t>Plot signal selection efficiency curves for ALPs of varying masses</a:t>
@@ -5103,8 +5101,8 @@
           <a:chExt cx="0" cy="0"/>
         </a:xfrm>
       </p:grpSpPr>
-      <mc:AlternateContent xmlns:mc="http://schemas.openxmlformats.org/markup-compatibility/2006">
-        <mc:Choice xmlns:a14="http://schemas.microsoft.com/office/drawing/2010/main" Requires="a14">
+      <mc:AlternateContent xmlns:mc="http://schemas.openxmlformats.org/markup-compatibility/2006" xmlns:a14="http://schemas.microsoft.com/office/drawing/2010/main">
+        <mc:Choice Requires="a14">
           <p:sp>
             <p:nvSpPr>
               <p:cNvPr id="2" name="Title 1">
@@ -5270,7 +5268,7 @@
             </p:txBody>
           </p:sp>
         </mc:Choice>
-        <mc:Fallback>
+        <mc:Fallback xmlns="">
           <p:sp>
             <p:nvSpPr>
               <p:cNvPr id="2" name="Title 1">
@@ -7387,8 +7385,8 @@
           </p:sp>
         </mc:Fallback>
       </mc:AlternateContent>
-      <mc:AlternateContent xmlns:mc="http://schemas.openxmlformats.org/markup-compatibility/2006">
-        <mc:Choice xmlns:a14="http://schemas.microsoft.com/office/drawing/2010/main" Requires="a14">
+      <mc:AlternateContent xmlns:mc="http://schemas.openxmlformats.org/markup-compatibility/2006" xmlns:a14="http://schemas.microsoft.com/office/drawing/2010/main">
+        <mc:Choice Requires="a14">
           <p:sp>
             <p:nvSpPr>
               <p:cNvPr id="3" name="Content Placeholder 2">
@@ -7528,16 +7526,7 @@
                               </a:solidFill>
                               <a:latin typeface="Cambria Math" panose="02040503050406030204" pitchFamily="18" charset="0"/>
                             </a:rPr>
-                            <m:t>0.</m:t>
-                          </m:r>
-                          <m:r>
-                            <a:rPr lang="en-AU" b="0" i="1" smtClean="0">
-                              <a:solidFill>
-                                <a:schemeClr val="tx1"/>
-                              </a:solidFill>
-                              <a:latin typeface="Cambria Math" panose="02040503050406030204" pitchFamily="18" charset="0"/>
-                            </a:rPr>
-                            <m:t>2479</m:t>
+                            <m:t>0.2479</m:t>
                           </m:r>
                         </m:num>
                         <m:den>
@@ -7556,19 +7545,7 @@
                         <a:rPr lang="en-AU" b="0" i="1" smtClean="0">
                           <a:latin typeface="Cambria Math" panose="02040503050406030204" pitchFamily="18" charset="0"/>
                         </a:rPr>
-                        <m:t>≈1.</m:t>
-                      </m:r>
-                      <m:r>
-                        <a:rPr lang="en-AU" b="0" i="1" smtClean="0">
-                          <a:latin typeface="Cambria Math" panose="02040503050406030204" pitchFamily="18" charset="0"/>
-                        </a:rPr>
-                        <m:t>4</m:t>
-                      </m:r>
-                      <m:r>
-                        <a:rPr lang="en-AU" b="0" i="1" smtClean="0">
-                          <a:latin typeface="Cambria Math" panose="02040503050406030204" pitchFamily="18" charset="0"/>
-                        </a:rPr>
-                        <m:t>4</m:t>
+                        <m:t>≈1.44</m:t>
                       </m:r>
                     </m:oMath>
                   </m:oMathPara>
@@ -7584,7 +7561,7 @@
             </p:txBody>
           </p:sp>
         </mc:Choice>
-        <mc:Fallback>
+        <mc:Fallback xmlns="">
           <p:sp>
             <p:nvSpPr>
               <p:cNvPr id="3" name="Content Placeholder 2">
@@ -7628,8 +7605,8 @@
           </p:sp>
         </mc:Fallback>
       </mc:AlternateContent>
-      <mc:AlternateContent xmlns:mc="http://schemas.openxmlformats.org/markup-compatibility/2006">
-        <mc:Choice xmlns:a14="http://schemas.microsoft.com/office/drawing/2010/main" Requires="a14">
+      <mc:AlternateContent xmlns:mc="http://schemas.openxmlformats.org/markup-compatibility/2006" xmlns:a14="http://schemas.microsoft.com/office/drawing/2010/main">
+        <mc:Choice Requires="a14">
           <p:sp>
             <p:nvSpPr>
               <p:cNvPr id="6" name="TextBox 5">
@@ -7758,7 +7735,7 @@
             </p:txBody>
           </p:sp>
         </mc:Choice>
-        <mc:Fallback>
+        <mc:Fallback xmlns="">
           <p:sp>
             <p:nvSpPr>
               <p:cNvPr id="6" name="TextBox 5">
@@ -7863,8 +7840,8 @@
           </a:prstGeom>
         </p:spPr>
       </p:pic>
-      <mc:AlternateContent xmlns:mc="http://schemas.openxmlformats.org/markup-compatibility/2006">
-        <mc:Choice xmlns:a14="http://schemas.microsoft.com/office/drawing/2010/main" Requires="a14">
+      <mc:AlternateContent xmlns:mc="http://schemas.openxmlformats.org/markup-compatibility/2006" xmlns:a14="http://schemas.microsoft.com/office/drawing/2010/main">
+        <mc:Choice Requires="a14">
           <p:sp>
             <p:nvSpPr>
               <p:cNvPr id="12" name="TextBox 11">
@@ -7972,11 +7949,11 @@
             </p:txBody>
           </p:sp>
         </mc:Choice>
-        <mc:Fallback>
+        <mc:Fallback xmlns="">
           <p:sp>
             <p:nvSpPr>
               <p:cNvPr id="12" name="TextBox 11">
-                <a:hlinkClick r:id="rId8"/>
+                <a:hlinkClick r:id="rId9"/>
                 <a:extLst>
                   <a:ext uri="{FF2B5EF4-FFF2-40B4-BE49-F238E27FC236}">
                     <a16:creationId xmlns:a16="http://schemas.microsoft.com/office/drawing/2014/main" id="{0E56EE9E-9DDA-530B-C364-1DEF1A5E9C92}"/>
@@ -7997,7 +7974,7 @@
                 <a:avLst/>
               </a:prstGeom>
               <a:blipFill>
-                <a:blip r:embed="rId9"/>
+                <a:blip r:embed="rId10"/>
                 <a:stretch>
                   <a:fillRect b="-3279"/>
                 </a:stretch>
@@ -8018,8 +7995,8 @@
           </p:sp>
         </mc:Fallback>
       </mc:AlternateContent>
-      <mc:AlternateContent xmlns:mc="http://schemas.openxmlformats.org/markup-compatibility/2006">
-        <mc:Choice xmlns:a14="http://schemas.microsoft.com/office/drawing/2010/main" Requires="a14">
+      <mc:AlternateContent xmlns:mc="http://schemas.openxmlformats.org/markup-compatibility/2006" xmlns:a14="http://schemas.microsoft.com/office/drawing/2010/main">
+        <mc:Choice Requires="a14">
           <p:sp>
             <p:nvSpPr>
               <p:cNvPr id="13" name="TextBox 12">
@@ -8387,13 +8364,7 @@
                             <a:rPr lang="en-AU" b="0" i="1" smtClean="0">
                               <a:latin typeface="Cambria Math" panose="02040503050406030204" pitchFamily="18" charset="0"/>
                             </a:rPr>
-                            <m:t>−</m:t>
-                          </m:r>
-                          <m:r>
-                            <a:rPr lang="en-AU" b="0" i="1" smtClean="0">
-                              <a:latin typeface="Cambria Math" panose="02040503050406030204" pitchFamily="18" charset="0"/>
-                            </a:rPr>
-                            <m:t>8</m:t>
+                            <m:t>−8</m:t>
                           </m:r>
                         </m:sup>
                       </m:sSup>
@@ -8546,7 +8517,7 @@
             </p:txBody>
           </p:sp>
         </mc:Choice>
-        <mc:Fallback>
+        <mc:Fallback xmlns="">
           <p:sp>
             <p:nvSpPr>
               <p:cNvPr id="13" name="TextBox 12">
@@ -8570,7 +8541,7 @@
                 <a:avLst/>
               </a:prstGeom>
               <a:blipFill>
-                <a:blip r:embed="rId10"/>
+                <a:blip r:embed="rId11"/>
                 <a:stretch>
                   <a:fillRect l="-486"/>
                 </a:stretch>
@@ -8621,8 +8592,8 @@
           <a:chExt cx="0" cy="0"/>
         </a:xfrm>
       </p:grpSpPr>
-      <mc:AlternateContent xmlns:mc="http://schemas.openxmlformats.org/markup-compatibility/2006">
-        <mc:Choice xmlns:a14="http://schemas.microsoft.com/office/drawing/2010/main" Requires="a14">
+      <mc:AlternateContent xmlns:mc="http://schemas.openxmlformats.org/markup-compatibility/2006" xmlns:a14="http://schemas.microsoft.com/office/drawing/2010/main">
+        <mc:Choice Requires="a14">
           <p:sp>
             <p:nvSpPr>
               <p:cNvPr id="2" name="Title 1">
@@ -8645,7 +8616,7 @@
               <a:lstStyle/>
               <a:p>
                 <a:r>
-                  <a:rPr lang="en-AU" dirty="0"/>
+                  <a:rPr lang="en-AU" b="1" dirty="0"/>
                   <a:t>Single Event Sensitivity of </a:t>
                 </a:r>
                 <a14:m>
@@ -8653,30 +8624,30 @@
                     <m:sSup>
                       <m:sSupPr>
                         <m:ctrlPr>
-                          <a:rPr lang="en-AU" b="0" i="1" smtClean="0">
+                          <a:rPr lang="en-AU" b="1" i="1" smtClean="0">
                             <a:latin typeface="Cambria Math" panose="02040503050406030204" pitchFamily="18" charset="0"/>
                           </a:rPr>
                         </m:ctrlPr>
                       </m:sSupPr>
                       <m:e>
                         <m:r>
-                          <a:rPr lang="en-AU" b="0" i="1" smtClean="0">
-                            <a:latin typeface="Cambria Math" panose="02040503050406030204" pitchFamily="18" charset="0"/>
-                          </a:rPr>
-                          <m:t>𝐵</m:t>
+                          <a:rPr lang="en-AU" b="1" i="1" smtClean="0">
+                            <a:latin typeface="Cambria Math" panose="02040503050406030204" pitchFamily="18" charset="0"/>
+                          </a:rPr>
+                          <m:t>𝑩</m:t>
                         </m:r>
                       </m:e>
                       <m:sup>
                         <m:r>
-                          <a:rPr lang="en-AU" b="0" i="1" smtClean="0">
-                            <a:latin typeface="Cambria Math" panose="02040503050406030204" pitchFamily="18" charset="0"/>
-                          </a:rPr>
-                          <m:t>0</m:t>
+                          <a:rPr lang="en-AU" b="1" i="1" smtClean="0">
+                            <a:latin typeface="Cambria Math" panose="02040503050406030204" pitchFamily="18" charset="0"/>
+                          </a:rPr>
+                          <m:t>𝟎</m:t>
                         </m:r>
                       </m:sup>
                     </m:sSup>
                     <m:r>
-                      <a:rPr lang="en-AU" b="0" i="1" smtClean="0">
+                      <a:rPr lang="en-AU" b="1" i="1" smtClean="0">
                         <a:latin typeface="Cambria Math" panose="02040503050406030204" pitchFamily="18" charset="0"/>
                       </a:rPr>
                       <m:t>→</m:t>
@@ -8684,42 +8655,48 @@
                     <m:sSup>
                       <m:sSupPr>
                         <m:ctrlPr>
-                          <a:rPr lang="en-AU" b="0" i="1" smtClean="0">
+                          <a:rPr lang="en-AU" b="1" i="1" smtClean="0">
                             <a:latin typeface="Cambria Math" panose="02040503050406030204" pitchFamily="18" charset="0"/>
                           </a:rPr>
                         </m:ctrlPr>
                       </m:sSupPr>
                       <m:e>
                         <m:r>
-                          <a:rPr lang="en-AU" b="0" i="1" smtClean="0">
-                            <a:latin typeface="Cambria Math" panose="02040503050406030204" pitchFamily="18" charset="0"/>
-                          </a:rPr>
-                          <m:t>𝐾</m:t>
+                          <a:rPr lang="en-AU" b="1" i="1" smtClean="0">
+                            <a:latin typeface="Cambria Math" panose="02040503050406030204" pitchFamily="18" charset="0"/>
+                          </a:rPr>
+                          <m:t>𝑲</m:t>
                         </m:r>
                       </m:e>
                       <m:sup>
                         <m:r>
-                          <a:rPr lang="en-AU" b="0" i="1" smtClean="0">
-                            <a:latin typeface="Cambria Math" panose="02040503050406030204" pitchFamily="18" charset="0"/>
-                          </a:rPr>
-                          <m:t>0∗</m:t>
+                          <a:rPr lang="en-AU" b="1" i="1" smtClean="0">
+                            <a:latin typeface="Cambria Math" panose="02040503050406030204" pitchFamily="18" charset="0"/>
+                          </a:rPr>
+                          <m:t>𝟎</m:t>
+                        </m:r>
+                        <m:r>
+                          <a:rPr lang="en-AU" b="1" i="1" smtClean="0">
+                            <a:latin typeface="Cambria Math" panose="02040503050406030204" pitchFamily="18" charset="0"/>
+                          </a:rPr>
+                          <m:t>∗</m:t>
                         </m:r>
                       </m:sup>
                     </m:sSup>
                     <m:r>
-                      <a:rPr lang="en-AU" b="0" i="1" smtClean="0">
+                      <a:rPr lang="en-AU" b="1" i="1" smtClean="0">
                         <a:latin typeface="Cambria Math" panose="02040503050406030204" pitchFamily="18" charset="0"/>
                       </a:rPr>
-                      <m:t>𝛾</m:t>
+                      <m:t>𝜸</m:t>
                     </m:r>
                   </m:oMath>
                 </a14:m>
-                <a:endParaRPr lang="en-AU" dirty="0"/>
+                <a:endParaRPr lang="en-AU" b="1" dirty="0"/>
               </a:p>
             </p:txBody>
           </p:sp>
         </mc:Choice>
-        <mc:Fallback>
+        <mc:Fallback xmlns="">
           <p:sp>
             <p:nvSpPr>
               <p:cNvPr id="2" name="Title 1">
@@ -8759,8 +8736,8 @@
           </p:sp>
         </mc:Fallback>
       </mc:AlternateContent>
-      <mc:AlternateContent xmlns:mc="http://schemas.openxmlformats.org/markup-compatibility/2006">
-        <mc:Choice xmlns:a14="http://schemas.microsoft.com/office/drawing/2010/main" Requires="a14">
+      <mc:AlternateContent xmlns:mc="http://schemas.openxmlformats.org/markup-compatibility/2006" xmlns:a14="http://schemas.microsoft.com/office/drawing/2010/main">
+        <mc:Choice Requires="a14">
           <p:sp>
             <p:nvSpPr>
               <p:cNvPr id="3" name="Content Placeholder 2">
@@ -9328,7 +9305,7 @@
             </p:txBody>
           </p:sp>
         </mc:Choice>
-        <mc:Fallback>
+        <mc:Fallback xmlns="">
           <p:sp>
             <p:nvSpPr>
               <p:cNvPr id="3" name="Content Placeholder 2">

</xml_diff>